<commit_message>
updated scatter titles and sizes. added to ppt
</commit_message>
<xml_diff>
--- a/DSE230 - Final Project Slides.pptx
+++ b/DSE230 - Final Project Slides.pptx
@@ -35,24 +35,27 @@
     <p:sldId id="281" r:id="rId29"/>
     <p:sldId id="277" r:id="rId30"/>
     <p:sldId id="286" r:id="rId31"/>
-    <p:sldId id="287" r:id="rId32"/>
-    <p:sldId id="283" r:id="rId33"/>
-    <p:sldId id="288" r:id="rId34"/>
-    <p:sldId id="289" r:id="rId35"/>
-    <p:sldId id="294" r:id="rId36"/>
-    <p:sldId id="296" r:id="rId37"/>
-    <p:sldId id="291" r:id="rId38"/>
-    <p:sldId id="298" r:id="rId39"/>
-    <p:sldId id="300" r:id="rId40"/>
-    <p:sldId id="303" r:id="rId41"/>
-    <p:sldId id="297" r:id="rId42"/>
-    <p:sldId id="295" r:id="rId43"/>
-    <p:sldId id="293" r:id="rId44"/>
-    <p:sldId id="302" r:id="rId45"/>
-    <p:sldId id="299" r:id="rId46"/>
-    <p:sldId id="304" r:id="rId47"/>
-    <p:sldId id="305" r:id="rId48"/>
-    <p:sldId id="306" r:id="rId49"/>
+    <p:sldId id="312" r:id="rId32"/>
+    <p:sldId id="311" r:id="rId33"/>
+    <p:sldId id="308" r:id="rId34"/>
+    <p:sldId id="287" r:id="rId35"/>
+    <p:sldId id="283" r:id="rId36"/>
+    <p:sldId id="288" r:id="rId37"/>
+    <p:sldId id="289" r:id="rId38"/>
+    <p:sldId id="294" r:id="rId39"/>
+    <p:sldId id="296" r:id="rId40"/>
+    <p:sldId id="291" r:id="rId41"/>
+    <p:sldId id="298" r:id="rId42"/>
+    <p:sldId id="300" r:id="rId43"/>
+    <p:sldId id="303" r:id="rId44"/>
+    <p:sldId id="297" r:id="rId45"/>
+    <p:sldId id="295" r:id="rId46"/>
+    <p:sldId id="293" r:id="rId47"/>
+    <p:sldId id="302" r:id="rId48"/>
+    <p:sldId id="299" r:id="rId49"/>
+    <p:sldId id="304" r:id="rId50"/>
+    <p:sldId id="305" r:id="rId51"/>
+    <p:sldId id="306" r:id="rId52"/>
   </p:sldIdLst>
   <p:sldSz cx="12192000" cy="6858000"/>
   <p:notesSz cx="6858000" cy="9144000"/>
@@ -162,6 +165,7 @@
 <file path=ppt/revisionInfo.xml><?xml version="1.0" encoding="utf-8"?>
 <p1510:revInfo xmlns:a="http://schemas.openxmlformats.org/drawingml/2006/main" xmlns:r="http://schemas.openxmlformats.org/officeDocument/2006/relationships" xmlns:p1510="http://schemas.microsoft.com/office/powerpoint/2015/10/main">
   <p1510:revLst>
+    <p1510:client id="{0A291B54-BB88-4BFC-8A15-73E947C42FA5}" v="18" dt="2022-05-27T01:31:24.562"/>
     <p1510:client id="{A33A2485-037C-4B50-B308-98610C4283B1}" v="94" dt="2022-05-26T22:26:49.632"/>
   </p1510:revLst>
 </p1510:revInfo>
@@ -2915,6 +2919,343 @@
             <ac:spMk id="3" creationId="{E3DD0EBC-B2B3-215D-66AC-D307CB092F12}"/>
           </ac:spMkLst>
         </pc:spChg>
+      </pc:sldChg>
+    </pc:docChg>
+  </pc:docChgLst>
+  <pc:docChgLst>
+    <pc:chgData name="Alejandro Hohmann" userId="53f6b3f0-f01f-4e25-87f6-70eb183c7d49" providerId="ADAL" clId="{0A291B54-BB88-4BFC-8A15-73E947C42FA5}"/>
+    <pc:docChg chg="custSel addSld delSld modSld">
+      <pc:chgData name="Alejandro Hohmann" userId="53f6b3f0-f01f-4e25-87f6-70eb183c7d49" providerId="ADAL" clId="{0A291B54-BB88-4BFC-8A15-73E947C42FA5}" dt="2022-05-27T01:32:54.203" v="235" actId="1076"/>
+      <pc:docMkLst>
+        <pc:docMk/>
+      </pc:docMkLst>
+      <pc:sldChg chg="modSp mod">
+        <pc:chgData name="Alejandro Hohmann" userId="53f6b3f0-f01f-4e25-87f6-70eb183c7d49" providerId="ADAL" clId="{0A291B54-BB88-4BFC-8A15-73E947C42FA5}" dt="2022-05-26T23:37:23.510" v="5" actId="27636"/>
+        <pc:sldMkLst>
+          <pc:docMk/>
+          <pc:sldMk cId="1673956646" sldId="256"/>
+        </pc:sldMkLst>
+        <pc:spChg chg="mod">
+          <ac:chgData name="Alejandro Hohmann" userId="53f6b3f0-f01f-4e25-87f6-70eb183c7d49" providerId="ADAL" clId="{0A291B54-BB88-4BFC-8A15-73E947C42FA5}" dt="2022-05-26T23:37:23.510" v="5" actId="27636"/>
+          <ac:spMkLst>
+            <pc:docMk/>
+            <pc:sldMk cId="1673956646" sldId="256"/>
+            <ac:spMk id="3" creationId="{A44AE168-9BEC-9254-2A1E-D665E0A18E19}"/>
+          </ac:spMkLst>
+        </pc:spChg>
+      </pc:sldChg>
+      <pc:sldChg chg="addSp delSp modSp mod">
+        <pc:chgData name="Alejandro Hohmann" userId="53f6b3f0-f01f-4e25-87f6-70eb183c7d49" providerId="ADAL" clId="{0A291B54-BB88-4BFC-8A15-73E947C42FA5}" dt="2022-05-27T01:31:20.266" v="229" actId="1076"/>
+        <pc:sldMkLst>
+          <pc:docMk/>
+          <pc:sldMk cId="3911671648" sldId="286"/>
+        </pc:sldMkLst>
+        <pc:spChg chg="mod">
+          <ac:chgData name="Alejandro Hohmann" userId="53f6b3f0-f01f-4e25-87f6-70eb183c7d49" providerId="ADAL" clId="{0A291B54-BB88-4BFC-8A15-73E947C42FA5}" dt="2022-05-27T01:21:17.869" v="45" actId="20577"/>
+          <ac:spMkLst>
+            <pc:docMk/>
+            <pc:sldMk cId="3911671648" sldId="286"/>
+            <ac:spMk id="2" creationId="{E2DB4482-B77A-6C31-560C-F8EC60009F53}"/>
+          </ac:spMkLst>
+        </pc:spChg>
+        <pc:spChg chg="add del mod">
+          <ac:chgData name="Alejandro Hohmann" userId="53f6b3f0-f01f-4e25-87f6-70eb183c7d49" providerId="ADAL" clId="{0A291B54-BB88-4BFC-8A15-73E947C42FA5}" dt="2022-05-27T00:50:01.825" v="19"/>
+          <ac:spMkLst>
+            <pc:docMk/>
+            <pc:sldMk cId="3911671648" sldId="286"/>
+            <ac:spMk id="4" creationId="{9F406987-E547-ADF8-C591-374FCE4472E8}"/>
+          </ac:spMkLst>
+        </pc:spChg>
+        <pc:spChg chg="add mod">
+          <ac:chgData name="Alejandro Hohmann" userId="53f6b3f0-f01f-4e25-87f6-70eb183c7d49" providerId="ADAL" clId="{0A291B54-BB88-4BFC-8A15-73E947C42FA5}" dt="2022-05-27T01:27:02.043" v="108" actId="20577"/>
+          <ac:spMkLst>
+            <pc:docMk/>
+            <pc:sldMk cId="3911671648" sldId="286"/>
+            <ac:spMk id="6" creationId="{446F6B91-1B6C-718B-6BD3-4A27768DA27B}"/>
+          </ac:spMkLst>
+        </pc:spChg>
+        <pc:spChg chg="add del mod">
+          <ac:chgData name="Alejandro Hohmann" userId="53f6b3f0-f01f-4e25-87f6-70eb183c7d49" providerId="ADAL" clId="{0A291B54-BB88-4BFC-8A15-73E947C42FA5}" dt="2022-05-27T00:50:51.537" v="22"/>
+          <ac:spMkLst>
+            <pc:docMk/>
+            <pc:sldMk cId="3911671648" sldId="286"/>
+            <ac:spMk id="12" creationId="{E1E728A6-64E5-263D-369C-D965C00233C0}"/>
+          </ac:spMkLst>
+        </pc:spChg>
+        <pc:spChg chg="add del mod">
+          <ac:chgData name="Alejandro Hohmann" userId="53f6b3f0-f01f-4e25-87f6-70eb183c7d49" providerId="ADAL" clId="{0A291B54-BB88-4BFC-8A15-73E947C42FA5}" dt="2022-05-27T00:51:15.275" v="24"/>
+          <ac:spMkLst>
+            <pc:docMk/>
+            <pc:sldMk cId="3911671648" sldId="286"/>
+            <ac:spMk id="15" creationId="{C285769C-E281-11D5-B67D-C7975CF73BE2}"/>
+          </ac:spMkLst>
+        </pc:spChg>
+        <pc:spChg chg="add mod">
+          <ac:chgData name="Alejandro Hohmann" userId="53f6b3f0-f01f-4e25-87f6-70eb183c7d49" providerId="ADAL" clId="{0A291B54-BB88-4BFC-8A15-73E947C42FA5}" dt="2022-05-27T01:26:52.499" v="97" actId="14100"/>
+          <ac:spMkLst>
+            <pc:docMk/>
+            <pc:sldMk cId="3911671648" sldId="286"/>
+            <ac:spMk id="18" creationId="{81561340-D4A7-1EAE-2E3D-B1682DAC2A9C}"/>
+          </ac:spMkLst>
+        </pc:spChg>
+        <pc:graphicFrameChg chg="add del mod">
+          <ac:chgData name="Alejandro Hohmann" userId="53f6b3f0-f01f-4e25-87f6-70eb183c7d49" providerId="ADAL" clId="{0A291B54-BB88-4BFC-8A15-73E947C42FA5}" dt="2022-05-27T00:45:29.518" v="11" actId="478"/>
+          <ac:graphicFrameMkLst>
+            <pc:docMk/>
+            <pc:sldMk cId="3911671648" sldId="286"/>
+            <ac:graphicFrameMk id="6" creationId="{5AA6B79A-7534-E1F7-562E-91D280C0A307}"/>
+          </ac:graphicFrameMkLst>
+        </pc:graphicFrameChg>
+        <pc:graphicFrameChg chg="add del mod">
+          <ac:chgData name="Alejandro Hohmann" userId="53f6b3f0-f01f-4e25-87f6-70eb183c7d49" providerId="ADAL" clId="{0A291B54-BB88-4BFC-8A15-73E947C42FA5}" dt="2022-05-27T00:46:40.651" v="13"/>
+          <ac:graphicFrameMkLst>
+            <pc:docMk/>
+            <pc:sldMk cId="3911671648" sldId="286"/>
+            <ac:graphicFrameMk id="7" creationId="{F1382969-9F4A-5E6F-C0F0-287128B918B0}"/>
+          </ac:graphicFrameMkLst>
+        </pc:graphicFrameChg>
+        <pc:graphicFrameChg chg="add del mod">
+          <ac:chgData name="Alejandro Hohmann" userId="53f6b3f0-f01f-4e25-87f6-70eb183c7d49" providerId="ADAL" clId="{0A291B54-BB88-4BFC-8A15-73E947C42FA5}" dt="2022-05-27T00:46:55.546" v="15"/>
+          <ac:graphicFrameMkLst>
+            <pc:docMk/>
+            <pc:sldMk cId="3911671648" sldId="286"/>
+            <ac:graphicFrameMk id="8" creationId="{63C87C08-1017-C0E1-5D46-4F94310B2A62}"/>
+          </ac:graphicFrameMkLst>
+        </pc:graphicFrameChg>
+        <pc:graphicFrameChg chg="add del mod">
+          <ac:chgData name="Alejandro Hohmann" userId="53f6b3f0-f01f-4e25-87f6-70eb183c7d49" providerId="ADAL" clId="{0A291B54-BB88-4BFC-8A15-73E947C42FA5}" dt="2022-05-27T00:48:33.907" v="18"/>
+          <ac:graphicFrameMkLst>
+            <pc:docMk/>
+            <pc:sldMk cId="3911671648" sldId="286"/>
+            <ac:graphicFrameMk id="9" creationId="{AA8409D8-56B8-1DC7-6322-E9000206D81C}"/>
+          </ac:graphicFrameMkLst>
+        </pc:graphicFrameChg>
+        <pc:graphicFrameChg chg="add del mod">
+          <ac:chgData name="Alejandro Hohmann" userId="53f6b3f0-f01f-4e25-87f6-70eb183c7d49" providerId="ADAL" clId="{0A291B54-BB88-4BFC-8A15-73E947C42FA5}" dt="2022-05-27T00:50:22.646" v="21" actId="478"/>
+          <ac:graphicFrameMkLst>
+            <pc:docMk/>
+            <pc:sldMk cId="3911671648" sldId="286"/>
+            <ac:graphicFrameMk id="10" creationId="{8EB713AD-43D6-5BC5-DD41-FD3DBDCF5553}"/>
+          </ac:graphicFrameMkLst>
+        </pc:graphicFrameChg>
+        <pc:graphicFrameChg chg="add del mod">
+          <ac:chgData name="Alejandro Hohmann" userId="53f6b3f0-f01f-4e25-87f6-70eb183c7d49" providerId="ADAL" clId="{0A291B54-BB88-4BFC-8A15-73E947C42FA5}" dt="2022-05-27T00:51:01.452" v="23" actId="478"/>
+          <ac:graphicFrameMkLst>
+            <pc:docMk/>
+            <pc:sldMk cId="3911671648" sldId="286"/>
+            <ac:graphicFrameMk id="13" creationId="{054E5B71-8FF0-FF46-57FA-23819D84D5C0}"/>
+          </ac:graphicFrameMkLst>
+        </pc:graphicFrameChg>
+        <pc:graphicFrameChg chg="add del mod">
+          <ac:chgData name="Alejandro Hohmann" userId="53f6b3f0-f01f-4e25-87f6-70eb183c7d49" providerId="ADAL" clId="{0A291B54-BB88-4BFC-8A15-73E947C42FA5}" dt="2022-05-27T00:51:25.375" v="25" actId="478"/>
+          <ac:graphicFrameMkLst>
+            <pc:docMk/>
+            <pc:sldMk cId="3911671648" sldId="286"/>
+            <ac:graphicFrameMk id="16" creationId="{B59294CB-F63C-1A91-A9B8-5856421EA871}"/>
+          </ac:graphicFrameMkLst>
+        </pc:graphicFrameChg>
+        <pc:picChg chg="add mod">
+          <ac:chgData name="Alejandro Hohmann" userId="53f6b3f0-f01f-4e25-87f6-70eb183c7d49" providerId="ADAL" clId="{0A291B54-BB88-4BFC-8A15-73E947C42FA5}" dt="2022-05-27T01:26:41.739" v="96" actId="14100"/>
+          <ac:picMkLst>
+            <pc:docMk/>
+            <pc:sldMk cId="3911671648" sldId="286"/>
+            <ac:picMk id="4" creationId="{F114850F-DEC6-AED2-04E1-1F1D4FFE535F}"/>
+          </ac:picMkLst>
+        </pc:picChg>
+        <pc:picChg chg="del">
+          <ac:chgData name="Alejandro Hohmann" userId="53f6b3f0-f01f-4e25-87f6-70eb183c7d49" providerId="ADAL" clId="{0A291B54-BB88-4BFC-8A15-73E947C42FA5}" dt="2022-05-27T00:45:12.982" v="9" actId="478"/>
+          <ac:picMkLst>
+            <pc:docMk/>
+            <pc:sldMk cId="3911671648" sldId="286"/>
+            <ac:picMk id="5" creationId="{A3A5503D-89C2-4CCD-FCE6-53568BFE8600}"/>
+          </ac:picMkLst>
+        </pc:picChg>
+        <pc:picChg chg="add mod">
+          <ac:chgData name="Alejandro Hohmann" userId="53f6b3f0-f01f-4e25-87f6-70eb183c7d49" providerId="ADAL" clId="{0A291B54-BB88-4BFC-8A15-73E947C42FA5}" dt="2022-05-27T01:27:12.115" v="112" actId="1076"/>
+          <ac:picMkLst>
+            <pc:docMk/>
+            <pc:sldMk cId="3911671648" sldId="286"/>
+            <ac:picMk id="7" creationId="{A7A58B16-7344-9582-1E99-5788574F93AB}"/>
+          </ac:picMkLst>
+        </pc:picChg>
+        <pc:picChg chg="add mod">
+          <ac:chgData name="Alejandro Hohmann" userId="53f6b3f0-f01f-4e25-87f6-70eb183c7d49" providerId="ADAL" clId="{0A291B54-BB88-4BFC-8A15-73E947C42FA5}" dt="2022-05-27T01:31:20.266" v="229" actId="1076"/>
+          <ac:picMkLst>
+            <pc:docMk/>
+            <pc:sldMk cId="3911671648" sldId="286"/>
+            <ac:picMk id="8" creationId="{C902ED6B-FA0D-EAB6-FECD-E28406D31035}"/>
+          </ac:picMkLst>
+        </pc:picChg>
+      </pc:sldChg>
+      <pc:sldChg chg="new del">
+        <pc:chgData name="Alejandro Hohmann" userId="53f6b3f0-f01f-4e25-87f6-70eb183c7d49" providerId="ADAL" clId="{0A291B54-BB88-4BFC-8A15-73E947C42FA5}" dt="2022-05-27T00:45:10.225" v="8" actId="47"/>
+        <pc:sldMkLst>
+          <pc:docMk/>
+          <pc:sldMk cId="2001671081" sldId="307"/>
+        </pc:sldMkLst>
+      </pc:sldChg>
+      <pc:sldChg chg="add">
+        <pc:chgData name="Alejandro Hohmann" userId="53f6b3f0-f01f-4e25-87f6-70eb183c7d49" providerId="ADAL" clId="{0A291B54-BB88-4BFC-8A15-73E947C42FA5}" dt="2022-05-27T00:45:08.996" v="7" actId="2890"/>
+        <pc:sldMkLst>
+          <pc:docMk/>
+          <pc:sldMk cId="1601540531" sldId="308"/>
+        </pc:sldMkLst>
+      </pc:sldChg>
+      <pc:sldChg chg="addSp modSp add del mod">
+        <pc:chgData name="Alejandro Hohmann" userId="53f6b3f0-f01f-4e25-87f6-70eb183c7d49" providerId="ADAL" clId="{0A291B54-BB88-4BFC-8A15-73E947C42FA5}" dt="2022-05-27T01:27:17.372" v="114" actId="47"/>
+        <pc:sldMkLst>
+          <pc:docMk/>
+          <pc:sldMk cId="1340642478" sldId="309"/>
+        </pc:sldMkLst>
+        <pc:spChg chg="mod">
+          <ac:chgData name="Alejandro Hohmann" userId="53f6b3f0-f01f-4e25-87f6-70eb183c7d49" providerId="ADAL" clId="{0A291B54-BB88-4BFC-8A15-73E947C42FA5}" dt="2022-05-27T01:26:16.611" v="94" actId="20577"/>
+          <ac:spMkLst>
+            <pc:docMk/>
+            <pc:sldMk cId="1340642478" sldId="309"/>
+            <ac:spMk id="18" creationId="{81561340-D4A7-1EAE-2E3D-B1682DAC2A9C}"/>
+          </ac:spMkLst>
+        </pc:spChg>
+        <pc:picChg chg="add mod">
+          <ac:chgData name="Alejandro Hohmann" userId="53f6b3f0-f01f-4e25-87f6-70eb183c7d49" providerId="ADAL" clId="{0A291B54-BB88-4BFC-8A15-73E947C42FA5}" dt="2022-05-27T01:26:11.634" v="80" actId="1076"/>
+          <ac:picMkLst>
+            <pc:docMk/>
+            <pc:sldMk cId="1340642478" sldId="309"/>
+            <ac:picMk id="4" creationId="{E1E6EAAC-DEFF-742D-683E-1542C614EE4F}"/>
+          </ac:picMkLst>
+        </pc:picChg>
+      </pc:sldChg>
+      <pc:sldChg chg="add del">
+        <pc:chgData name="Alejandro Hohmann" userId="53f6b3f0-f01f-4e25-87f6-70eb183c7d49" providerId="ADAL" clId="{0A291B54-BB88-4BFC-8A15-73E947C42FA5}" dt="2022-05-27T01:27:19.593" v="115" actId="47"/>
+        <pc:sldMkLst>
+          <pc:docMk/>
+          <pc:sldMk cId="426622585" sldId="310"/>
+        </pc:sldMkLst>
+      </pc:sldChg>
+      <pc:sldChg chg="addSp delSp modSp add mod">
+        <pc:chgData name="Alejandro Hohmann" userId="53f6b3f0-f01f-4e25-87f6-70eb183c7d49" providerId="ADAL" clId="{0A291B54-BB88-4BFC-8A15-73E947C42FA5}" dt="2022-05-27T01:32:54.203" v="235" actId="1076"/>
+        <pc:sldMkLst>
+          <pc:docMk/>
+          <pc:sldMk cId="1213255862" sldId="311"/>
+        </pc:sldMkLst>
+        <pc:spChg chg="add mod">
+          <ac:chgData name="Alejandro Hohmann" userId="53f6b3f0-f01f-4e25-87f6-70eb183c7d49" providerId="ADAL" clId="{0A291B54-BB88-4BFC-8A15-73E947C42FA5}" dt="2022-05-27T01:29:29.660" v="213" actId="20577"/>
+          <ac:spMkLst>
+            <pc:docMk/>
+            <pc:sldMk cId="1213255862" sldId="311"/>
+            <ac:spMk id="4" creationId="{9263500E-53FA-1114-E605-E3F331DF61B6}"/>
+          </ac:spMkLst>
+        </pc:spChg>
+        <pc:spChg chg="mod">
+          <ac:chgData name="Alejandro Hohmann" userId="53f6b3f0-f01f-4e25-87f6-70eb183c7d49" providerId="ADAL" clId="{0A291B54-BB88-4BFC-8A15-73E947C42FA5}" dt="2022-05-27T01:29:15.628" v="194" actId="20577"/>
+          <ac:spMkLst>
+            <pc:docMk/>
+            <pc:sldMk cId="1213255862" sldId="311"/>
+            <ac:spMk id="18" creationId="{81561340-D4A7-1EAE-2E3D-B1682DAC2A9C}"/>
+          </ac:spMkLst>
+        </pc:spChg>
+        <pc:picChg chg="add del mod">
+          <ac:chgData name="Alejandro Hohmann" userId="53f6b3f0-f01f-4e25-87f6-70eb183c7d49" providerId="ADAL" clId="{0A291B54-BB88-4BFC-8A15-73E947C42FA5}" dt="2022-05-27T01:30:51.068" v="222" actId="478"/>
+          <ac:picMkLst>
+            <pc:docMk/>
+            <pc:sldMk cId="1213255862" sldId="311"/>
+            <ac:picMk id="5" creationId="{B4C78ADD-DC71-9F3A-4E2D-3BCF343C65E7}"/>
+          </ac:picMkLst>
+        </pc:picChg>
+        <pc:picChg chg="add del mod">
+          <ac:chgData name="Alejandro Hohmann" userId="53f6b3f0-f01f-4e25-87f6-70eb183c7d49" providerId="ADAL" clId="{0A291B54-BB88-4BFC-8A15-73E947C42FA5}" dt="2022-05-27T01:32:47.771" v="232" actId="478"/>
+          <ac:picMkLst>
+            <pc:docMk/>
+            <pc:sldMk cId="1213255862" sldId="311"/>
+            <ac:picMk id="7" creationId="{8E795784-064A-F3BF-E6C8-13DD1BC34D81}"/>
+          </ac:picMkLst>
+        </pc:picChg>
+        <pc:picChg chg="add mod">
+          <ac:chgData name="Alejandro Hohmann" userId="53f6b3f0-f01f-4e25-87f6-70eb183c7d49" providerId="ADAL" clId="{0A291B54-BB88-4BFC-8A15-73E947C42FA5}" dt="2022-05-27T01:30:59.968" v="227" actId="1076"/>
+          <ac:picMkLst>
+            <pc:docMk/>
+            <pc:sldMk cId="1213255862" sldId="311"/>
+            <ac:picMk id="9" creationId="{E3C0E0D2-3976-1144-12B0-7040D872F166}"/>
+          </ac:picMkLst>
+        </pc:picChg>
+        <pc:picChg chg="add mod">
+          <ac:chgData name="Alejandro Hohmann" userId="53f6b3f0-f01f-4e25-87f6-70eb183c7d49" providerId="ADAL" clId="{0A291B54-BB88-4BFC-8A15-73E947C42FA5}" dt="2022-05-27T01:31:24.562" v="231"/>
+          <ac:picMkLst>
+            <pc:docMk/>
+            <pc:sldMk cId="1213255862" sldId="311"/>
+            <ac:picMk id="11" creationId="{D17CB4B3-4EB8-2A16-4F16-E9196F67887C}"/>
+          </ac:picMkLst>
+        </pc:picChg>
+        <pc:picChg chg="add mod">
+          <ac:chgData name="Alejandro Hohmann" userId="53f6b3f0-f01f-4e25-87f6-70eb183c7d49" providerId="ADAL" clId="{0A291B54-BB88-4BFC-8A15-73E947C42FA5}" dt="2022-05-27T01:32:54.203" v="235" actId="1076"/>
+          <ac:picMkLst>
+            <pc:docMk/>
+            <pc:sldMk cId="1213255862" sldId="311"/>
+            <ac:picMk id="12" creationId="{C9C60CF7-AB0B-99A4-D49F-F96788E85B8C}"/>
+          </ac:picMkLst>
+        </pc:picChg>
+      </pc:sldChg>
+      <pc:sldChg chg="addSp delSp modSp add mod">
+        <pc:chgData name="Alejandro Hohmann" userId="53f6b3f0-f01f-4e25-87f6-70eb183c7d49" providerId="ADAL" clId="{0A291B54-BB88-4BFC-8A15-73E947C42FA5}" dt="2022-05-27T01:31:23.236" v="230"/>
+        <pc:sldMkLst>
+          <pc:docMk/>
+          <pc:sldMk cId="2970166909" sldId="312"/>
+        </pc:sldMkLst>
+        <pc:spChg chg="mod">
+          <ac:chgData name="Alejandro Hohmann" userId="53f6b3f0-f01f-4e25-87f6-70eb183c7d49" providerId="ADAL" clId="{0A291B54-BB88-4BFC-8A15-73E947C42FA5}" dt="2022-05-27T01:27:25.803" v="125" actId="20577"/>
+          <ac:spMkLst>
+            <pc:docMk/>
+            <pc:sldMk cId="2970166909" sldId="312"/>
+            <ac:spMk id="6" creationId="{446F6B91-1B6C-718B-6BD3-4A27768DA27B}"/>
+          </ac:spMkLst>
+        </pc:spChg>
+        <pc:spChg chg="mod">
+          <ac:chgData name="Alejandro Hohmann" userId="53f6b3f0-f01f-4e25-87f6-70eb183c7d49" providerId="ADAL" clId="{0A291B54-BB88-4BFC-8A15-73E947C42FA5}" dt="2022-05-27T01:27:22.955" v="120" actId="20577"/>
+          <ac:spMkLst>
+            <pc:docMk/>
+            <pc:sldMk cId="2970166909" sldId="312"/>
+            <ac:spMk id="18" creationId="{81561340-D4A7-1EAE-2E3D-B1682DAC2A9C}"/>
+          </ac:spMkLst>
+        </pc:spChg>
+        <pc:picChg chg="del mod">
+          <ac:chgData name="Alejandro Hohmann" userId="53f6b3f0-f01f-4e25-87f6-70eb183c7d49" providerId="ADAL" clId="{0A291B54-BB88-4BFC-8A15-73E947C42FA5}" dt="2022-05-27T01:28:00.075" v="136" actId="478"/>
+          <ac:picMkLst>
+            <pc:docMk/>
+            <pc:sldMk cId="2970166909" sldId="312"/>
+            <ac:picMk id="4" creationId="{F114850F-DEC6-AED2-04E1-1F1D4FFE535F}"/>
+          </ac:picMkLst>
+        </pc:picChg>
+        <pc:picChg chg="add mod">
+          <ac:chgData name="Alejandro Hohmann" userId="53f6b3f0-f01f-4e25-87f6-70eb183c7d49" providerId="ADAL" clId="{0A291B54-BB88-4BFC-8A15-73E947C42FA5}" dt="2022-05-27T01:28:05.187" v="138" actId="2085"/>
+          <ac:picMkLst>
+            <pc:docMk/>
+            <pc:sldMk cId="2970166909" sldId="312"/>
+            <ac:picMk id="5" creationId="{C6E348F4-92DB-F9C5-BD7C-53B713436147}"/>
+          </ac:picMkLst>
+        </pc:picChg>
+        <pc:picChg chg="del">
+          <ac:chgData name="Alejandro Hohmann" userId="53f6b3f0-f01f-4e25-87f6-70eb183c7d49" providerId="ADAL" clId="{0A291B54-BB88-4BFC-8A15-73E947C42FA5}" dt="2022-05-27T01:28:32.971" v="141" actId="478"/>
+          <ac:picMkLst>
+            <pc:docMk/>
+            <pc:sldMk cId="2970166909" sldId="312"/>
+            <ac:picMk id="7" creationId="{A7A58B16-7344-9582-1E99-5788574F93AB}"/>
+          </ac:picMkLst>
+        </pc:picChg>
+        <pc:picChg chg="add mod">
+          <ac:chgData name="Alejandro Hohmann" userId="53f6b3f0-f01f-4e25-87f6-70eb183c7d49" providerId="ADAL" clId="{0A291B54-BB88-4BFC-8A15-73E947C42FA5}" dt="2022-05-27T01:28:37.690" v="142" actId="1076"/>
+          <ac:picMkLst>
+            <pc:docMk/>
+            <pc:sldMk cId="2970166909" sldId="312"/>
+            <ac:picMk id="9" creationId="{50C6FDEF-BA5A-7E7E-598A-0E392D10EF32}"/>
+          </ac:picMkLst>
+        </pc:picChg>
+        <pc:picChg chg="add mod">
+          <ac:chgData name="Alejandro Hohmann" userId="53f6b3f0-f01f-4e25-87f6-70eb183c7d49" providerId="ADAL" clId="{0A291B54-BB88-4BFC-8A15-73E947C42FA5}" dt="2022-05-27T01:31:23.236" v="230"/>
+          <ac:picMkLst>
+            <pc:docMk/>
+            <pc:sldMk cId="2970166909" sldId="312"/>
+            <ac:picMk id="11" creationId="{AEF05825-42DD-A4AC-0F7F-26B35C38AD0B}"/>
+          </ac:picMkLst>
+        </pc:picChg>
       </pc:sldChg>
     </pc:docChg>
   </pc:docChgLst>
@@ -6269,28 +6610,28 @@
           <a:p>
             <a:pPr algn="l"/>
             <a:r>
-              <a:rPr lang="en-US" sz="2000"/>
+              <a:rPr lang="en-US" sz="2000" dirty="0"/>
               <a:t>Alejandro Hohmann</a:t>
             </a:r>
           </a:p>
           <a:p>
             <a:pPr algn="l"/>
             <a:r>
-              <a:rPr lang="en-US" sz="2000"/>
+              <a:rPr lang="en-US" sz="2000" dirty="0"/>
+              <a:t>Garrett Michael</a:t>
+            </a:r>
+          </a:p>
+          <a:p>
+            <a:pPr algn="l"/>
+            <a:r>
+              <a:rPr lang="en-US" sz="2000" dirty="0"/>
               <a:t>Leonardo </a:t>
             </a:r>
             <a:r>
-              <a:rPr lang="en-US" sz="2000" err="1"/>
+              <a:rPr lang="en-US" sz="2000" dirty="0" err="1"/>
               <a:t>Clo</a:t>
             </a:r>
-            <a:endParaRPr lang="en-US" sz="2000"/>
-          </a:p>
-          <a:p>
-            <a:pPr algn="l"/>
-            <a:r>
-              <a:rPr lang="en-US" sz="2000"/>
-              <a:t>Garrett Michael</a:t>
-            </a:r>
+            <a:endParaRPr lang="en-US" sz="2000" dirty="0"/>
           </a:p>
         </p:txBody>
       </p:sp>
@@ -11406,25 +11747,59 @@
           <a:bodyPr/>
           <a:lstStyle/>
           <a:p>
-            <a:endParaRPr lang="en-US"/>
+            <a:r>
+              <a:rPr lang="en-US" dirty="0"/>
+              <a:t>Add 3D Scatter Plots</a:t>
+            </a:r>
+          </a:p>
+        </p:txBody>
+      </p:sp>
+      <p:sp>
+        <p:nvSpPr>
+          <p:cNvPr id="18" name="Content Placeholder 17">
+            <a:extLst>
+              <a:ext uri="{FF2B5EF4-FFF2-40B4-BE49-F238E27FC236}">
+                <a16:creationId xmlns:a16="http://schemas.microsoft.com/office/drawing/2014/main" id="{81561340-D4A7-1EAE-2E3D-B1682DAC2A9C}"/>
+              </a:ext>
+            </a:extLst>
+          </p:cNvPr>
+          <p:cNvSpPr>
+            <a:spLocks noGrp="1"/>
+          </p:cNvSpPr>
+          <p:nvPr>
+            <p:ph idx="1"/>
+          </p:nvPr>
+        </p:nvSpPr>
+        <p:spPr>
+          <a:xfrm>
+            <a:off x="838200" y="1825625"/>
+            <a:ext cx="5257800" cy="4351338"/>
+          </a:xfrm>
+        </p:spPr>
+        <p:txBody>
+          <a:bodyPr/>
+          <a:lstStyle/>
+          <a:p>
+            <a:r>
+              <a:rPr lang="en-US" dirty="0"/>
+              <a:t>Phone Accelerometer</a:t>
+            </a:r>
           </a:p>
         </p:txBody>
       </p:sp>
       <p:pic>
         <p:nvPicPr>
-          <p:cNvPr id="5" name="Content Placeholder 4">
-            <a:extLst>
-              <a:ext uri="{FF2B5EF4-FFF2-40B4-BE49-F238E27FC236}">
-                <a16:creationId xmlns:a16="http://schemas.microsoft.com/office/drawing/2014/main" id="{A3A5503D-89C2-4CCD-FCE6-53568BFE8600}"/>
+          <p:cNvPr id="4" name="Picture 3">
+            <a:extLst>
+              <a:ext uri="{FF2B5EF4-FFF2-40B4-BE49-F238E27FC236}">
+                <a16:creationId xmlns:a16="http://schemas.microsoft.com/office/drawing/2014/main" id="{F114850F-DEC6-AED2-04E1-1F1D4FFE535F}"/>
               </a:ext>
             </a:extLst>
           </p:cNvPr>
           <p:cNvPicPr>
-            <a:picLocks noGrp="1" noChangeAspect="1"/>
+            <a:picLocks noChangeAspect="1"/>
           </p:cNvPicPr>
-          <p:nvPr>
-            <p:ph idx="1"/>
-          </p:nvPr>
+          <p:nvPr/>
         </p:nvPicPr>
         <p:blipFill>
           <a:blip r:embed="rId2"/>
@@ -11434,9 +11809,271 @@
         </p:blipFill>
         <p:spPr>
           <a:xfrm>
-            <a:off x="838200" y="1890636"/>
-            <a:ext cx="10515600" cy="4221315"/>
-          </a:xfrm>
+            <a:off x="998376" y="2445762"/>
+            <a:ext cx="4911011" cy="4412237"/>
+          </a:xfrm>
+          <a:prstGeom prst="rect">
+            <a:avLst/>
+          </a:prstGeom>
+        </p:spPr>
+      </p:pic>
+      <p:sp>
+        <p:nvSpPr>
+          <p:cNvPr id="6" name="Content Placeholder 17">
+            <a:extLst>
+              <a:ext uri="{FF2B5EF4-FFF2-40B4-BE49-F238E27FC236}">
+                <a16:creationId xmlns:a16="http://schemas.microsoft.com/office/drawing/2014/main" id="{446F6B91-1B6C-718B-6BD3-4A27768DA27B}"/>
+              </a:ext>
+            </a:extLst>
+          </p:cNvPr>
+          <p:cNvSpPr txBox="1">
+            <a:spLocks/>
+          </p:cNvSpPr>
+          <p:nvPr/>
+        </p:nvSpPr>
+        <p:spPr>
+          <a:xfrm>
+            <a:off x="6282615" y="1825625"/>
+            <a:ext cx="5257800" cy="4351338"/>
+          </a:xfrm>
+          <a:prstGeom prst="rect">
+            <a:avLst/>
+          </a:prstGeom>
+        </p:spPr>
+        <p:txBody>
+          <a:bodyPr vert="horz" lIns="91440" tIns="45720" rIns="91440" bIns="45720" rtlCol="0">
+            <a:normAutofit/>
+          </a:bodyPr>
+          <a:lstStyle>
+            <a:lvl1pPr marL="228600" indent="-228600" algn="l" defTabSz="914400" rtl="0" eaLnBrk="1" latinLnBrk="0" hangingPunct="1">
+              <a:lnSpc>
+                <a:spcPct val="90000"/>
+              </a:lnSpc>
+              <a:spcBef>
+                <a:spcPts val="1000"/>
+              </a:spcBef>
+              <a:buFont typeface="Arial" panose="020B0604020202020204" pitchFamily="34" charset="0"/>
+              <a:buChar char="•"/>
+              <a:defRPr sz="2800" kern="1200">
+                <a:solidFill>
+                  <a:schemeClr val="tx1"/>
+                </a:solidFill>
+                <a:latin typeface="+mn-lt"/>
+                <a:ea typeface="+mn-ea"/>
+                <a:cs typeface="+mn-cs"/>
+              </a:defRPr>
+            </a:lvl1pPr>
+            <a:lvl2pPr marL="685800" indent="-228600" algn="l" defTabSz="914400" rtl="0" eaLnBrk="1" latinLnBrk="0" hangingPunct="1">
+              <a:lnSpc>
+                <a:spcPct val="90000"/>
+              </a:lnSpc>
+              <a:spcBef>
+                <a:spcPts val="500"/>
+              </a:spcBef>
+              <a:buFont typeface="Arial" panose="020B0604020202020204" pitchFamily="34" charset="0"/>
+              <a:buChar char="•"/>
+              <a:defRPr sz="2400" kern="1200">
+                <a:solidFill>
+                  <a:schemeClr val="tx1"/>
+                </a:solidFill>
+                <a:latin typeface="+mn-lt"/>
+                <a:ea typeface="+mn-ea"/>
+                <a:cs typeface="+mn-cs"/>
+              </a:defRPr>
+            </a:lvl2pPr>
+            <a:lvl3pPr marL="1143000" indent="-228600" algn="l" defTabSz="914400" rtl="0" eaLnBrk="1" latinLnBrk="0" hangingPunct="1">
+              <a:lnSpc>
+                <a:spcPct val="90000"/>
+              </a:lnSpc>
+              <a:spcBef>
+                <a:spcPts val="500"/>
+              </a:spcBef>
+              <a:buFont typeface="Arial" panose="020B0604020202020204" pitchFamily="34" charset="0"/>
+              <a:buChar char="•"/>
+              <a:defRPr sz="2000" kern="1200">
+                <a:solidFill>
+                  <a:schemeClr val="tx1"/>
+                </a:solidFill>
+                <a:latin typeface="+mn-lt"/>
+                <a:ea typeface="+mn-ea"/>
+                <a:cs typeface="+mn-cs"/>
+              </a:defRPr>
+            </a:lvl3pPr>
+            <a:lvl4pPr marL="1600200" indent="-228600" algn="l" defTabSz="914400" rtl="0" eaLnBrk="1" latinLnBrk="0" hangingPunct="1">
+              <a:lnSpc>
+                <a:spcPct val="90000"/>
+              </a:lnSpc>
+              <a:spcBef>
+                <a:spcPts val="500"/>
+              </a:spcBef>
+              <a:buFont typeface="Arial" panose="020B0604020202020204" pitchFamily="34" charset="0"/>
+              <a:buChar char="•"/>
+              <a:defRPr sz="1800" kern="1200">
+                <a:solidFill>
+                  <a:schemeClr val="tx1"/>
+                </a:solidFill>
+                <a:latin typeface="+mn-lt"/>
+                <a:ea typeface="+mn-ea"/>
+                <a:cs typeface="+mn-cs"/>
+              </a:defRPr>
+            </a:lvl4pPr>
+            <a:lvl5pPr marL="2057400" indent="-228600" algn="l" defTabSz="914400" rtl="0" eaLnBrk="1" latinLnBrk="0" hangingPunct="1">
+              <a:lnSpc>
+                <a:spcPct val="90000"/>
+              </a:lnSpc>
+              <a:spcBef>
+                <a:spcPts val="500"/>
+              </a:spcBef>
+              <a:buFont typeface="Arial" panose="020B0604020202020204" pitchFamily="34" charset="0"/>
+              <a:buChar char="•"/>
+              <a:defRPr sz="1800" kern="1200">
+                <a:solidFill>
+                  <a:schemeClr val="tx1"/>
+                </a:solidFill>
+                <a:latin typeface="+mn-lt"/>
+                <a:ea typeface="+mn-ea"/>
+                <a:cs typeface="+mn-cs"/>
+              </a:defRPr>
+            </a:lvl5pPr>
+            <a:lvl6pPr marL="2514600" indent="-228600" algn="l" defTabSz="914400" rtl="0" eaLnBrk="1" latinLnBrk="0" hangingPunct="1">
+              <a:lnSpc>
+                <a:spcPct val="90000"/>
+              </a:lnSpc>
+              <a:spcBef>
+                <a:spcPts val="500"/>
+              </a:spcBef>
+              <a:buFont typeface="Arial" panose="020B0604020202020204" pitchFamily="34" charset="0"/>
+              <a:buChar char="•"/>
+              <a:defRPr sz="1800" kern="1200">
+                <a:solidFill>
+                  <a:schemeClr val="tx1"/>
+                </a:solidFill>
+                <a:latin typeface="+mn-lt"/>
+                <a:ea typeface="+mn-ea"/>
+                <a:cs typeface="+mn-cs"/>
+              </a:defRPr>
+            </a:lvl6pPr>
+            <a:lvl7pPr marL="2971800" indent="-228600" algn="l" defTabSz="914400" rtl="0" eaLnBrk="1" latinLnBrk="0" hangingPunct="1">
+              <a:lnSpc>
+                <a:spcPct val="90000"/>
+              </a:lnSpc>
+              <a:spcBef>
+                <a:spcPts val="500"/>
+              </a:spcBef>
+              <a:buFont typeface="Arial" panose="020B0604020202020204" pitchFamily="34" charset="0"/>
+              <a:buChar char="•"/>
+              <a:defRPr sz="1800" kern="1200">
+                <a:solidFill>
+                  <a:schemeClr val="tx1"/>
+                </a:solidFill>
+                <a:latin typeface="+mn-lt"/>
+                <a:ea typeface="+mn-ea"/>
+                <a:cs typeface="+mn-cs"/>
+              </a:defRPr>
+            </a:lvl7pPr>
+            <a:lvl8pPr marL="3429000" indent="-228600" algn="l" defTabSz="914400" rtl="0" eaLnBrk="1" latinLnBrk="0" hangingPunct="1">
+              <a:lnSpc>
+                <a:spcPct val="90000"/>
+              </a:lnSpc>
+              <a:spcBef>
+                <a:spcPts val="500"/>
+              </a:spcBef>
+              <a:buFont typeface="Arial" panose="020B0604020202020204" pitchFamily="34" charset="0"/>
+              <a:buChar char="•"/>
+              <a:defRPr sz="1800" kern="1200">
+                <a:solidFill>
+                  <a:schemeClr val="tx1"/>
+                </a:solidFill>
+                <a:latin typeface="+mn-lt"/>
+                <a:ea typeface="+mn-ea"/>
+                <a:cs typeface="+mn-cs"/>
+              </a:defRPr>
+            </a:lvl8pPr>
+            <a:lvl9pPr marL="3886200" indent="-228600" algn="l" defTabSz="914400" rtl="0" eaLnBrk="1" latinLnBrk="0" hangingPunct="1">
+              <a:lnSpc>
+                <a:spcPct val="90000"/>
+              </a:lnSpc>
+              <a:spcBef>
+                <a:spcPts val="500"/>
+              </a:spcBef>
+              <a:buFont typeface="Arial" panose="020B0604020202020204" pitchFamily="34" charset="0"/>
+              <a:buChar char="•"/>
+              <a:defRPr sz="1800" kern="1200">
+                <a:solidFill>
+                  <a:schemeClr val="tx1"/>
+                </a:solidFill>
+                <a:latin typeface="+mn-lt"/>
+                <a:ea typeface="+mn-ea"/>
+                <a:cs typeface="+mn-cs"/>
+              </a:defRPr>
+            </a:lvl9pPr>
+          </a:lstStyle>
+          <a:p>
+            <a:r>
+              <a:rPr lang="en-US" dirty="0"/>
+              <a:t>Phone Gyroscope</a:t>
+            </a:r>
+          </a:p>
+        </p:txBody>
+      </p:sp>
+      <p:pic>
+        <p:nvPicPr>
+          <p:cNvPr id="7" name="Picture 6">
+            <a:extLst>
+              <a:ext uri="{FF2B5EF4-FFF2-40B4-BE49-F238E27FC236}">
+                <a16:creationId xmlns:a16="http://schemas.microsoft.com/office/drawing/2014/main" id="{A7A58B16-7344-9582-1E99-5788574F93AB}"/>
+              </a:ext>
+            </a:extLst>
+          </p:cNvPr>
+          <p:cNvPicPr>
+            <a:picLocks noChangeAspect="1"/>
+          </p:cNvPicPr>
+          <p:nvPr/>
+        </p:nvPicPr>
+        <p:blipFill>
+          <a:blip r:embed="rId3"/>
+          <a:stretch>
+            <a:fillRect/>
+          </a:stretch>
+        </p:blipFill>
+        <p:spPr>
+          <a:xfrm>
+            <a:off x="5909386" y="2799184"/>
+            <a:ext cx="5153387" cy="4058816"/>
+          </a:xfrm>
+          <a:prstGeom prst="rect">
+            <a:avLst/>
+          </a:prstGeom>
+        </p:spPr>
+      </p:pic>
+      <p:pic>
+        <p:nvPicPr>
+          <p:cNvPr id="8" name="Picture 7">
+            <a:extLst>
+              <a:ext uri="{FF2B5EF4-FFF2-40B4-BE49-F238E27FC236}">
+                <a16:creationId xmlns:a16="http://schemas.microsoft.com/office/drawing/2014/main" id="{C902ED6B-FA0D-EAB6-FECD-E28406D31035}"/>
+              </a:ext>
+            </a:extLst>
+          </p:cNvPr>
+          <p:cNvPicPr>
+            <a:picLocks noChangeAspect="1"/>
+          </p:cNvPicPr>
+          <p:nvPr/>
+        </p:nvPicPr>
+        <p:blipFill>
+          <a:blip r:embed="rId4"/>
+          <a:stretch>
+            <a:fillRect/>
+          </a:stretch>
+        </p:blipFill>
+        <p:spPr>
+          <a:xfrm>
+            <a:off x="135486" y="2445762"/>
+            <a:ext cx="676275" cy="3590925"/>
+          </a:xfrm>
+          <a:prstGeom prst="rect">
+            <a:avLst/>
+          </a:prstGeom>
         </p:spPr>
       </p:pic>
     </p:spTree>
@@ -11474,7 +12111,7 @@
           <p:cNvPr id="2" name="Title 1">
             <a:extLst>
               <a:ext uri="{FF2B5EF4-FFF2-40B4-BE49-F238E27FC236}">
-                <a16:creationId xmlns:a16="http://schemas.microsoft.com/office/drawing/2014/main" id="{F9C484B9-ADA9-CF40-2AD8-256F7B213087}"/>
+                <a16:creationId xmlns:a16="http://schemas.microsoft.com/office/drawing/2014/main" id="{E2DB4482-B77A-6C31-560C-F8EC60009F53}"/>
               </a:ext>
             </a:extLst>
           </p:cNvPr>
@@ -11490,25 +12127,258 @@
           <a:bodyPr/>
           <a:lstStyle/>
           <a:p>
-            <a:endParaRPr lang="en-US"/>
+            <a:r>
+              <a:rPr lang="en-US" dirty="0"/>
+              <a:t>Add 3D Scatter Plots</a:t>
+            </a:r>
+          </a:p>
+        </p:txBody>
+      </p:sp>
+      <p:sp>
+        <p:nvSpPr>
+          <p:cNvPr id="18" name="Content Placeholder 17">
+            <a:extLst>
+              <a:ext uri="{FF2B5EF4-FFF2-40B4-BE49-F238E27FC236}">
+                <a16:creationId xmlns:a16="http://schemas.microsoft.com/office/drawing/2014/main" id="{81561340-D4A7-1EAE-2E3D-B1682DAC2A9C}"/>
+              </a:ext>
+            </a:extLst>
+          </p:cNvPr>
+          <p:cNvSpPr>
+            <a:spLocks noGrp="1"/>
+          </p:cNvSpPr>
+          <p:nvPr>
+            <p:ph idx="1"/>
+          </p:nvPr>
+        </p:nvSpPr>
+        <p:spPr>
+          <a:xfrm>
+            <a:off x="838200" y="1825625"/>
+            <a:ext cx="5257800" cy="4351338"/>
+          </a:xfrm>
+        </p:spPr>
+        <p:txBody>
+          <a:bodyPr/>
+          <a:lstStyle/>
+          <a:p>
+            <a:r>
+              <a:rPr lang="en-US" dirty="0"/>
+              <a:t>Watch Accelerometer</a:t>
+            </a:r>
+          </a:p>
+        </p:txBody>
+      </p:sp>
+      <p:sp>
+        <p:nvSpPr>
+          <p:cNvPr id="6" name="Content Placeholder 17">
+            <a:extLst>
+              <a:ext uri="{FF2B5EF4-FFF2-40B4-BE49-F238E27FC236}">
+                <a16:creationId xmlns:a16="http://schemas.microsoft.com/office/drawing/2014/main" id="{446F6B91-1B6C-718B-6BD3-4A27768DA27B}"/>
+              </a:ext>
+            </a:extLst>
+          </p:cNvPr>
+          <p:cNvSpPr txBox="1">
+            <a:spLocks/>
+          </p:cNvSpPr>
+          <p:nvPr/>
+        </p:nvSpPr>
+        <p:spPr>
+          <a:xfrm>
+            <a:off x="6282615" y="1825625"/>
+            <a:ext cx="5257800" cy="4351338"/>
+          </a:xfrm>
+          <a:prstGeom prst="rect">
+            <a:avLst/>
+          </a:prstGeom>
+        </p:spPr>
+        <p:txBody>
+          <a:bodyPr vert="horz" lIns="91440" tIns="45720" rIns="91440" bIns="45720" rtlCol="0">
+            <a:normAutofit/>
+          </a:bodyPr>
+          <a:lstStyle>
+            <a:lvl1pPr marL="228600" indent="-228600" algn="l" defTabSz="914400" rtl="0" eaLnBrk="1" latinLnBrk="0" hangingPunct="1">
+              <a:lnSpc>
+                <a:spcPct val="90000"/>
+              </a:lnSpc>
+              <a:spcBef>
+                <a:spcPts val="1000"/>
+              </a:spcBef>
+              <a:buFont typeface="Arial" panose="020B0604020202020204" pitchFamily="34" charset="0"/>
+              <a:buChar char="•"/>
+              <a:defRPr sz="2800" kern="1200">
+                <a:solidFill>
+                  <a:schemeClr val="tx1"/>
+                </a:solidFill>
+                <a:latin typeface="+mn-lt"/>
+                <a:ea typeface="+mn-ea"/>
+                <a:cs typeface="+mn-cs"/>
+              </a:defRPr>
+            </a:lvl1pPr>
+            <a:lvl2pPr marL="685800" indent="-228600" algn="l" defTabSz="914400" rtl="0" eaLnBrk="1" latinLnBrk="0" hangingPunct="1">
+              <a:lnSpc>
+                <a:spcPct val="90000"/>
+              </a:lnSpc>
+              <a:spcBef>
+                <a:spcPts val="500"/>
+              </a:spcBef>
+              <a:buFont typeface="Arial" panose="020B0604020202020204" pitchFamily="34" charset="0"/>
+              <a:buChar char="•"/>
+              <a:defRPr sz="2400" kern="1200">
+                <a:solidFill>
+                  <a:schemeClr val="tx1"/>
+                </a:solidFill>
+                <a:latin typeface="+mn-lt"/>
+                <a:ea typeface="+mn-ea"/>
+                <a:cs typeface="+mn-cs"/>
+              </a:defRPr>
+            </a:lvl2pPr>
+            <a:lvl3pPr marL="1143000" indent="-228600" algn="l" defTabSz="914400" rtl="0" eaLnBrk="1" latinLnBrk="0" hangingPunct="1">
+              <a:lnSpc>
+                <a:spcPct val="90000"/>
+              </a:lnSpc>
+              <a:spcBef>
+                <a:spcPts val="500"/>
+              </a:spcBef>
+              <a:buFont typeface="Arial" panose="020B0604020202020204" pitchFamily="34" charset="0"/>
+              <a:buChar char="•"/>
+              <a:defRPr sz="2000" kern="1200">
+                <a:solidFill>
+                  <a:schemeClr val="tx1"/>
+                </a:solidFill>
+                <a:latin typeface="+mn-lt"/>
+                <a:ea typeface="+mn-ea"/>
+                <a:cs typeface="+mn-cs"/>
+              </a:defRPr>
+            </a:lvl3pPr>
+            <a:lvl4pPr marL="1600200" indent="-228600" algn="l" defTabSz="914400" rtl="0" eaLnBrk="1" latinLnBrk="0" hangingPunct="1">
+              <a:lnSpc>
+                <a:spcPct val="90000"/>
+              </a:lnSpc>
+              <a:spcBef>
+                <a:spcPts val="500"/>
+              </a:spcBef>
+              <a:buFont typeface="Arial" panose="020B0604020202020204" pitchFamily="34" charset="0"/>
+              <a:buChar char="•"/>
+              <a:defRPr sz="1800" kern="1200">
+                <a:solidFill>
+                  <a:schemeClr val="tx1"/>
+                </a:solidFill>
+                <a:latin typeface="+mn-lt"/>
+                <a:ea typeface="+mn-ea"/>
+                <a:cs typeface="+mn-cs"/>
+              </a:defRPr>
+            </a:lvl4pPr>
+            <a:lvl5pPr marL="2057400" indent="-228600" algn="l" defTabSz="914400" rtl="0" eaLnBrk="1" latinLnBrk="0" hangingPunct="1">
+              <a:lnSpc>
+                <a:spcPct val="90000"/>
+              </a:lnSpc>
+              <a:spcBef>
+                <a:spcPts val="500"/>
+              </a:spcBef>
+              <a:buFont typeface="Arial" panose="020B0604020202020204" pitchFamily="34" charset="0"/>
+              <a:buChar char="•"/>
+              <a:defRPr sz="1800" kern="1200">
+                <a:solidFill>
+                  <a:schemeClr val="tx1"/>
+                </a:solidFill>
+                <a:latin typeface="+mn-lt"/>
+                <a:ea typeface="+mn-ea"/>
+                <a:cs typeface="+mn-cs"/>
+              </a:defRPr>
+            </a:lvl5pPr>
+            <a:lvl6pPr marL="2514600" indent="-228600" algn="l" defTabSz="914400" rtl="0" eaLnBrk="1" latinLnBrk="0" hangingPunct="1">
+              <a:lnSpc>
+                <a:spcPct val="90000"/>
+              </a:lnSpc>
+              <a:spcBef>
+                <a:spcPts val="500"/>
+              </a:spcBef>
+              <a:buFont typeface="Arial" panose="020B0604020202020204" pitchFamily="34" charset="0"/>
+              <a:buChar char="•"/>
+              <a:defRPr sz="1800" kern="1200">
+                <a:solidFill>
+                  <a:schemeClr val="tx1"/>
+                </a:solidFill>
+                <a:latin typeface="+mn-lt"/>
+                <a:ea typeface="+mn-ea"/>
+                <a:cs typeface="+mn-cs"/>
+              </a:defRPr>
+            </a:lvl6pPr>
+            <a:lvl7pPr marL="2971800" indent="-228600" algn="l" defTabSz="914400" rtl="0" eaLnBrk="1" latinLnBrk="0" hangingPunct="1">
+              <a:lnSpc>
+                <a:spcPct val="90000"/>
+              </a:lnSpc>
+              <a:spcBef>
+                <a:spcPts val="500"/>
+              </a:spcBef>
+              <a:buFont typeface="Arial" panose="020B0604020202020204" pitchFamily="34" charset="0"/>
+              <a:buChar char="•"/>
+              <a:defRPr sz="1800" kern="1200">
+                <a:solidFill>
+                  <a:schemeClr val="tx1"/>
+                </a:solidFill>
+                <a:latin typeface="+mn-lt"/>
+                <a:ea typeface="+mn-ea"/>
+                <a:cs typeface="+mn-cs"/>
+              </a:defRPr>
+            </a:lvl7pPr>
+            <a:lvl8pPr marL="3429000" indent="-228600" algn="l" defTabSz="914400" rtl="0" eaLnBrk="1" latinLnBrk="0" hangingPunct="1">
+              <a:lnSpc>
+                <a:spcPct val="90000"/>
+              </a:lnSpc>
+              <a:spcBef>
+                <a:spcPts val="500"/>
+              </a:spcBef>
+              <a:buFont typeface="Arial" panose="020B0604020202020204" pitchFamily="34" charset="0"/>
+              <a:buChar char="•"/>
+              <a:defRPr sz="1800" kern="1200">
+                <a:solidFill>
+                  <a:schemeClr val="tx1"/>
+                </a:solidFill>
+                <a:latin typeface="+mn-lt"/>
+                <a:ea typeface="+mn-ea"/>
+                <a:cs typeface="+mn-cs"/>
+              </a:defRPr>
+            </a:lvl8pPr>
+            <a:lvl9pPr marL="3886200" indent="-228600" algn="l" defTabSz="914400" rtl="0" eaLnBrk="1" latinLnBrk="0" hangingPunct="1">
+              <a:lnSpc>
+                <a:spcPct val="90000"/>
+              </a:lnSpc>
+              <a:spcBef>
+                <a:spcPts val="500"/>
+              </a:spcBef>
+              <a:buFont typeface="Arial" panose="020B0604020202020204" pitchFamily="34" charset="0"/>
+              <a:buChar char="•"/>
+              <a:defRPr sz="1800" kern="1200">
+                <a:solidFill>
+                  <a:schemeClr val="tx1"/>
+                </a:solidFill>
+                <a:latin typeface="+mn-lt"/>
+                <a:ea typeface="+mn-ea"/>
+                <a:cs typeface="+mn-cs"/>
+              </a:defRPr>
+            </a:lvl9pPr>
+          </a:lstStyle>
+          <a:p>
+            <a:r>
+              <a:rPr lang="en-US" dirty="0"/>
+              <a:t>Watch Gyroscope</a:t>
+            </a:r>
           </a:p>
         </p:txBody>
       </p:sp>
       <p:pic>
         <p:nvPicPr>
-          <p:cNvPr id="5" name="Content Placeholder 4">
-            <a:extLst>
-              <a:ext uri="{FF2B5EF4-FFF2-40B4-BE49-F238E27FC236}">
-                <a16:creationId xmlns:a16="http://schemas.microsoft.com/office/drawing/2014/main" id="{38D772CA-0F26-0DE4-EBB2-196AC7DB6AC6}"/>
+          <p:cNvPr id="5" name="Picture 4">
+            <a:extLst>
+              <a:ext uri="{FF2B5EF4-FFF2-40B4-BE49-F238E27FC236}">
+                <a16:creationId xmlns:a16="http://schemas.microsoft.com/office/drawing/2014/main" id="{C6E348F4-92DB-F9C5-BD7C-53B713436147}"/>
               </a:ext>
             </a:extLst>
           </p:cNvPr>
           <p:cNvPicPr>
-            <a:picLocks noGrp="1" noChangeAspect="1"/>
+            <a:picLocks noChangeAspect="1"/>
           </p:cNvPicPr>
-          <p:nvPr>
-            <p:ph idx="1"/>
-          </p:nvPr>
+          <p:nvPr/>
         </p:nvPicPr>
         <p:blipFill>
           <a:blip r:embed="rId2"/>
@@ -11518,15 +12388,81 @@
         </p:blipFill>
         <p:spPr>
           <a:xfrm>
-            <a:off x="838200" y="1872600"/>
-            <a:ext cx="10515600" cy="4257388"/>
-          </a:xfrm>
+            <a:off x="375254" y="2786280"/>
+            <a:ext cx="5720746" cy="4084624"/>
+          </a:xfrm>
+          <a:prstGeom prst="rect">
+            <a:avLst/>
+          </a:prstGeom>
+          <a:ln>
+            <a:noFill/>
+          </a:ln>
+        </p:spPr>
+      </p:pic>
+      <p:pic>
+        <p:nvPicPr>
+          <p:cNvPr id="9" name="Picture 8">
+            <a:extLst>
+              <a:ext uri="{FF2B5EF4-FFF2-40B4-BE49-F238E27FC236}">
+                <a16:creationId xmlns:a16="http://schemas.microsoft.com/office/drawing/2014/main" id="{50C6FDEF-BA5A-7E7E-598A-0E392D10EF32}"/>
+              </a:ext>
+            </a:extLst>
+          </p:cNvPr>
+          <p:cNvPicPr>
+            <a:picLocks noChangeAspect="1"/>
+          </p:cNvPicPr>
+          <p:nvPr/>
+        </p:nvPicPr>
+        <p:blipFill>
+          <a:blip r:embed="rId3"/>
+          <a:stretch>
+            <a:fillRect/>
+          </a:stretch>
+        </p:blipFill>
+        <p:spPr>
+          <a:xfrm>
+            <a:off x="5994654" y="2441359"/>
+            <a:ext cx="5058425" cy="4416641"/>
+          </a:xfrm>
+          <a:prstGeom prst="rect">
+            <a:avLst/>
+          </a:prstGeom>
+        </p:spPr>
+      </p:pic>
+      <p:pic>
+        <p:nvPicPr>
+          <p:cNvPr id="11" name="Picture 10">
+            <a:extLst>
+              <a:ext uri="{FF2B5EF4-FFF2-40B4-BE49-F238E27FC236}">
+                <a16:creationId xmlns:a16="http://schemas.microsoft.com/office/drawing/2014/main" id="{AEF05825-42DD-A4AC-0F7F-26B35C38AD0B}"/>
+              </a:ext>
+            </a:extLst>
+          </p:cNvPr>
+          <p:cNvPicPr>
+            <a:picLocks noChangeAspect="1"/>
+          </p:cNvPicPr>
+          <p:nvPr/>
+        </p:nvPicPr>
+        <p:blipFill>
+          <a:blip r:embed="rId4"/>
+          <a:stretch>
+            <a:fillRect/>
+          </a:stretch>
+        </p:blipFill>
+        <p:spPr>
+          <a:xfrm>
+            <a:off x="135486" y="2445762"/>
+            <a:ext cx="676275" cy="3590925"/>
+          </a:xfrm>
+          <a:prstGeom prst="rect">
+            <a:avLst/>
+          </a:prstGeom>
         </p:spPr>
       </p:pic>
     </p:spTree>
     <p:extLst>
       <p:ext uri="{BB962C8B-B14F-4D97-AF65-F5344CB8AC3E}">
-        <p14:creationId xmlns:p14="http://schemas.microsoft.com/office/powerpoint/2010/main" val="1526440202"/>
+        <p14:creationId xmlns:p14="http://schemas.microsoft.com/office/powerpoint/2010/main" val="2970166909"/>
       </p:ext>
     </p:extLst>
   </p:cSld>
@@ -11558,6 +12494,561 @@
           <p:cNvPr id="2" name="Title 1">
             <a:extLst>
               <a:ext uri="{FF2B5EF4-FFF2-40B4-BE49-F238E27FC236}">
+                <a16:creationId xmlns:a16="http://schemas.microsoft.com/office/drawing/2014/main" id="{E2DB4482-B77A-6C31-560C-F8EC60009F53}"/>
+              </a:ext>
+            </a:extLst>
+          </p:cNvPr>
+          <p:cNvSpPr>
+            <a:spLocks noGrp="1"/>
+          </p:cNvSpPr>
+          <p:nvPr>
+            <p:ph type="title"/>
+          </p:nvPr>
+        </p:nvSpPr>
+        <p:spPr/>
+        <p:txBody>
+          <a:bodyPr/>
+          <a:lstStyle/>
+          <a:p>
+            <a:r>
+              <a:rPr lang="en-US" dirty="0"/>
+              <a:t>Add 3D Scatter Plots</a:t>
+            </a:r>
+          </a:p>
+        </p:txBody>
+      </p:sp>
+      <p:sp>
+        <p:nvSpPr>
+          <p:cNvPr id="18" name="Content Placeholder 17">
+            <a:extLst>
+              <a:ext uri="{FF2B5EF4-FFF2-40B4-BE49-F238E27FC236}">
+                <a16:creationId xmlns:a16="http://schemas.microsoft.com/office/drawing/2014/main" id="{81561340-D4A7-1EAE-2E3D-B1682DAC2A9C}"/>
+              </a:ext>
+            </a:extLst>
+          </p:cNvPr>
+          <p:cNvSpPr>
+            <a:spLocks noGrp="1"/>
+          </p:cNvSpPr>
+          <p:nvPr>
+            <p:ph idx="1"/>
+          </p:nvPr>
+        </p:nvSpPr>
+        <p:spPr/>
+        <p:txBody>
+          <a:bodyPr/>
+          <a:lstStyle/>
+          <a:p>
+            <a:r>
+              <a:rPr lang="en-US" dirty="0"/>
+              <a:t>Cosine Similarity</a:t>
+            </a:r>
+          </a:p>
+          <a:p>
+            <a:r>
+              <a:rPr lang="en-US" dirty="0"/>
+              <a:t>Phone Accelerometer</a:t>
+            </a:r>
+          </a:p>
+        </p:txBody>
+      </p:sp>
+      <p:sp>
+        <p:nvSpPr>
+          <p:cNvPr id="4" name="Content Placeholder 17">
+            <a:extLst>
+              <a:ext uri="{FF2B5EF4-FFF2-40B4-BE49-F238E27FC236}">
+                <a16:creationId xmlns:a16="http://schemas.microsoft.com/office/drawing/2014/main" id="{9263500E-53FA-1114-E605-E3F331DF61B6}"/>
+              </a:ext>
+            </a:extLst>
+          </p:cNvPr>
+          <p:cNvSpPr txBox="1">
+            <a:spLocks/>
+          </p:cNvSpPr>
+          <p:nvPr/>
+        </p:nvSpPr>
+        <p:spPr>
+          <a:xfrm>
+            <a:off x="6282615" y="1825625"/>
+            <a:ext cx="5257800" cy="4351338"/>
+          </a:xfrm>
+          <a:prstGeom prst="rect">
+            <a:avLst/>
+          </a:prstGeom>
+        </p:spPr>
+        <p:txBody>
+          <a:bodyPr vert="horz" lIns="91440" tIns="45720" rIns="91440" bIns="45720" rtlCol="0">
+            <a:normAutofit/>
+          </a:bodyPr>
+          <a:lstStyle>
+            <a:lvl1pPr marL="228600" indent="-228600" algn="l" defTabSz="914400" rtl="0" eaLnBrk="1" latinLnBrk="0" hangingPunct="1">
+              <a:lnSpc>
+                <a:spcPct val="90000"/>
+              </a:lnSpc>
+              <a:spcBef>
+                <a:spcPts val="1000"/>
+              </a:spcBef>
+              <a:buFont typeface="Arial" panose="020B0604020202020204" pitchFamily="34" charset="0"/>
+              <a:buChar char="•"/>
+              <a:defRPr sz="2800" kern="1200">
+                <a:solidFill>
+                  <a:schemeClr val="tx1"/>
+                </a:solidFill>
+                <a:latin typeface="+mn-lt"/>
+                <a:ea typeface="+mn-ea"/>
+                <a:cs typeface="+mn-cs"/>
+              </a:defRPr>
+            </a:lvl1pPr>
+            <a:lvl2pPr marL="685800" indent="-228600" algn="l" defTabSz="914400" rtl="0" eaLnBrk="1" latinLnBrk="0" hangingPunct="1">
+              <a:lnSpc>
+                <a:spcPct val="90000"/>
+              </a:lnSpc>
+              <a:spcBef>
+                <a:spcPts val="500"/>
+              </a:spcBef>
+              <a:buFont typeface="Arial" panose="020B0604020202020204" pitchFamily="34" charset="0"/>
+              <a:buChar char="•"/>
+              <a:defRPr sz="2400" kern="1200">
+                <a:solidFill>
+                  <a:schemeClr val="tx1"/>
+                </a:solidFill>
+                <a:latin typeface="+mn-lt"/>
+                <a:ea typeface="+mn-ea"/>
+                <a:cs typeface="+mn-cs"/>
+              </a:defRPr>
+            </a:lvl2pPr>
+            <a:lvl3pPr marL="1143000" indent="-228600" algn="l" defTabSz="914400" rtl="0" eaLnBrk="1" latinLnBrk="0" hangingPunct="1">
+              <a:lnSpc>
+                <a:spcPct val="90000"/>
+              </a:lnSpc>
+              <a:spcBef>
+                <a:spcPts val="500"/>
+              </a:spcBef>
+              <a:buFont typeface="Arial" panose="020B0604020202020204" pitchFamily="34" charset="0"/>
+              <a:buChar char="•"/>
+              <a:defRPr sz="2000" kern="1200">
+                <a:solidFill>
+                  <a:schemeClr val="tx1"/>
+                </a:solidFill>
+                <a:latin typeface="+mn-lt"/>
+                <a:ea typeface="+mn-ea"/>
+                <a:cs typeface="+mn-cs"/>
+              </a:defRPr>
+            </a:lvl3pPr>
+            <a:lvl4pPr marL="1600200" indent="-228600" algn="l" defTabSz="914400" rtl="0" eaLnBrk="1" latinLnBrk="0" hangingPunct="1">
+              <a:lnSpc>
+                <a:spcPct val="90000"/>
+              </a:lnSpc>
+              <a:spcBef>
+                <a:spcPts val="500"/>
+              </a:spcBef>
+              <a:buFont typeface="Arial" panose="020B0604020202020204" pitchFamily="34" charset="0"/>
+              <a:buChar char="•"/>
+              <a:defRPr sz="1800" kern="1200">
+                <a:solidFill>
+                  <a:schemeClr val="tx1"/>
+                </a:solidFill>
+                <a:latin typeface="+mn-lt"/>
+                <a:ea typeface="+mn-ea"/>
+                <a:cs typeface="+mn-cs"/>
+              </a:defRPr>
+            </a:lvl4pPr>
+            <a:lvl5pPr marL="2057400" indent="-228600" algn="l" defTabSz="914400" rtl="0" eaLnBrk="1" latinLnBrk="0" hangingPunct="1">
+              <a:lnSpc>
+                <a:spcPct val="90000"/>
+              </a:lnSpc>
+              <a:spcBef>
+                <a:spcPts val="500"/>
+              </a:spcBef>
+              <a:buFont typeface="Arial" panose="020B0604020202020204" pitchFamily="34" charset="0"/>
+              <a:buChar char="•"/>
+              <a:defRPr sz="1800" kern="1200">
+                <a:solidFill>
+                  <a:schemeClr val="tx1"/>
+                </a:solidFill>
+                <a:latin typeface="+mn-lt"/>
+                <a:ea typeface="+mn-ea"/>
+                <a:cs typeface="+mn-cs"/>
+              </a:defRPr>
+            </a:lvl5pPr>
+            <a:lvl6pPr marL="2514600" indent="-228600" algn="l" defTabSz="914400" rtl="0" eaLnBrk="1" latinLnBrk="0" hangingPunct="1">
+              <a:lnSpc>
+                <a:spcPct val="90000"/>
+              </a:lnSpc>
+              <a:spcBef>
+                <a:spcPts val="500"/>
+              </a:spcBef>
+              <a:buFont typeface="Arial" panose="020B0604020202020204" pitchFamily="34" charset="0"/>
+              <a:buChar char="•"/>
+              <a:defRPr sz="1800" kern="1200">
+                <a:solidFill>
+                  <a:schemeClr val="tx1"/>
+                </a:solidFill>
+                <a:latin typeface="+mn-lt"/>
+                <a:ea typeface="+mn-ea"/>
+                <a:cs typeface="+mn-cs"/>
+              </a:defRPr>
+            </a:lvl6pPr>
+            <a:lvl7pPr marL="2971800" indent="-228600" algn="l" defTabSz="914400" rtl="0" eaLnBrk="1" latinLnBrk="0" hangingPunct="1">
+              <a:lnSpc>
+                <a:spcPct val="90000"/>
+              </a:lnSpc>
+              <a:spcBef>
+                <a:spcPts val="500"/>
+              </a:spcBef>
+              <a:buFont typeface="Arial" panose="020B0604020202020204" pitchFamily="34" charset="0"/>
+              <a:buChar char="•"/>
+              <a:defRPr sz="1800" kern="1200">
+                <a:solidFill>
+                  <a:schemeClr val="tx1"/>
+                </a:solidFill>
+                <a:latin typeface="+mn-lt"/>
+                <a:ea typeface="+mn-ea"/>
+                <a:cs typeface="+mn-cs"/>
+              </a:defRPr>
+            </a:lvl7pPr>
+            <a:lvl8pPr marL="3429000" indent="-228600" algn="l" defTabSz="914400" rtl="0" eaLnBrk="1" latinLnBrk="0" hangingPunct="1">
+              <a:lnSpc>
+                <a:spcPct val="90000"/>
+              </a:lnSpc>
+              <a:spcBef>
+                <a:spcPts val="500"/>
+              </a:spcBef>
+              <a:buFont typeface="Arial" panose="020B0604020202020204" pitchFamily="34" charset="0"/>
+              <a:buChar char="•"/>
+              <a:defRPr sz="1800" kern="1200">
+                <a:solidFill>
+                  <a:schemeClr val="tx1"/>
+                </a:solidFill>
+                <a:latin typeface="+mn-lt"/>
+                <a:ea typeface="+mn-ea"/>
+                <a:cs typeface="+mn-cs"/>
+              </a:defRPr>
+            </a:lvl8pPr>
+            <a:lvl9pPr marL="3886200" indent="-228600" algn="l" defTabSz="914400" rtl="0" eaLnBrk="1" latinLnBrk="0" hangingPunct="1">
+              <a:lnSpc>
+                <a:spcPct val="90000"/>
+              </a:lnSpc>
+              <a:spcBef>
+                <a:spcPts val="500"/>
+              </a:spcBef>
+              <a:buFont typeface="Arial" panose="020B0604020202020204" pitchFamily="34" charset="0"/>
+              <a:buChar char="•"/>
+              <a:defRPr sz="1800" kern="1200">
+                <a:solidFill>
+                  <a:schemeClr val="tx1"/>
+                </a:solidFill>
+                <a:latin typeface="+mn-lt"/>
+                <a:ea typeface="+mn-ea"/>
+                <a:cs typeface="+mn-cs"/>
+              </a:defRPr>
+            </a:lvl9pPr>
+          </a:lstStyle>
+          <a:p>
+            <a:r>
+              <a:rPr lang="en-US" dirty="0"/>
+              <a:t>Cosine Similarity</a:t>
+            </a:r>
+          </a:p>
+          <a:p>
+            <a:r>
+              <a:rPr lang="en-US" dirty="0"/>
+              <a:t>Watch Gyroscope</a:t>
+            </a:r>
+          </a:p>
+        </p:txBody>
+      </p:sp>
+      <p:pic>
+        <p:nvPicPr>
+          <p:cNvPr id="9" name="Picture 8">
+            <a:extLst>
+              <a:ext uri="{FF2B5EF4-FFF2-40B4-BE49-F238E27FC236}">
+                <a16:creationId xmlns:a16="http://schemas.microsoft.com/office/drawing/2014/main" id="{E3C0E0D2-3976-1144-12B0-7040D872F166}"/>
+              </a:ext>
+            </a:extLst>
+          </p:cNvPr>
+          <p:cNvPicPr>
+            <a:picLocks noChangeAspect="1"/>
+          </p:cNvPicPr>
+          <p:nvPr/>
+        </p:nvPicPr>
+        <p:blipFill>
+          <a:blip r:embed="rId2"/>
+          <a:stretch>
+            <a:fillRect/>
+          </a:stretch>
+        </p:blipFill>
+        <p:spPr>
+          <a:xfrm>
+            <a:off x="651585" y="2697049"/>
+            <a:ext cx="4582967" cy="4221327"/>
+          </a:xfrm>
+          <a:prstGeom prst="rect">
+            <a:avLst/>
+          </a:prstGeom>
+        </p:spPr>
+      </p:pic>
+      <p:pic>
+        <p:nvPicPr>
+          <p:cNvPr id="11" name="Picture 10">
+            <a:extLst>
+              <a:ext uri="{FF2B5EF4-FFF2-40B4-BE49-F238E27FC236}">
+                <a16:creationId xmlns:a16="http://schemas.microsoft.com/office/drawing/2014/main" id="{D17CB4B3-4EB8-2A16-4F16-E9196F67887C}"/>
+              </a:ext>
+            </a:extLst>
+          </p:cNvPr>
+          <p:cNvPicPr>
+            <a:picLocks noChangeAspect="1"/>
+          </p:cNvPicPr>
+          <p:nvPr/>
+        </p:nvPicPr>
+        <p:blipFill>
+          <a:blip r:embed="rId3"/>
+          <a:stretch>
+            <a:fillRect/>
+          </a:stretch>
+        </p:blipFill>
+        <p:spPr>
+          <a:xfrm>
+            <a:off x="135486" y="2445762"/>
+            <a:ext cx="676275" cy="3590925"/>
+          </a:xfrm>
+          <a:prstGeom prst="rect">
+            <a:avLst/>
+          </a:prstGeom>
+        </p:spPr>
+      </p:pic>
+      <p:pic>
+        <p:nvPicPr>
+          <p:cNvPr id="12" name="Picture 11">
+            <a:extLst>
+              <a:ext uri="{FF2B5EF4-FFF2-40B4-BE49-F238E27FC236}">
+                <a16:creationId xmlns:a16="http://schemas.microsoft.com/office/drawing/2014/main" id="{C9C60CF7-AB0B-99A4-D49F-F96788E85B8C}"/>
+              </a:ext>
+            </a:extLst>
+          </p:cNvPr>
+          <p:cNvPicPr>
+            <a:picLocks noChangeAspect="1"/>
+          </p:cNvPicPr>
+          <p:nvPr/>
+        </p:nvPicPr>
+        <p:blipFill>
+          <a:blip r:embed="rId4"/>
+          <a:stretch>
+            <a:fillRect/>
+          </a:stretch>
+        </p:blipFill>
+        <p:spPr>
+          <a:xfrm>
+            <a:off x="6096000" y="2982895"/>
+            <a:ext cx="4132790" cy="3794557"/>
+          </a:xfrm>
+          <a:prstGeom prst="rect">
+            <a:avLst/>
+          </a:prstGeom>
+        </p:spPr>
+      </p:pic>
+    </p:spTree>
+    <p:extLst>
+      <p:ext uri="{BB962C8B-B14F-4D97-AF65-F5344CB8AC3E}">
+        <p14:creationId xmlns:p14="http://schemas.microsoft.com/office/powerpoint/2010/main" val="1213255862"/>
+      </p:ext>
+    </p:extLst>
+  </p:cSld>
+  <p:clrMapOvr>
+    <a:masterClrMapping/>
+  </p:clrMapOvr>
+</p:sld>
+</file>
+
+<file path=ppt/slides/slide33.xml><?xml version="1.0" encoding="utf-8"?>
+<p:sld xmlns:a="http://schemas.openxmlformats.org/drawingml/2006/main" xmlns:r="http://schemas.openxmlformats.org/officeDocument/2006/relationships" xmlns:p="http://schemas.openxmlformats.org/presentationml/2006/main">
+  <p:cSld>
+    <p:spTree>
+      <p:nvGrpSpPr>
+        <p:cNvPr id="1" name=""/>
+        <p:cNvGrpSpPr/>
+        <p:nvPr/>
+      </p:nvGrpSpPr>
+      <p:grpSpPr>
+        <a:xfrm>
+          <a:off x="0" y="0"/>
+          <a:ext cx="0" cy="0"/>
+          <a:chOff x="0" y="0"/>
+          <a:chExt cx="0" cy="0"/>
+        </a:xfrm>
+      </p:grpSpPr>
+      <p:sp>
+        <p:nvSpPr>
+          <p:cNvPr id="2" name="Title 1">
+            <a:extLst>
+              <a:ext uri="{FF2B5EF4-FFF2-40B4-BE49-F238E27FC236}">
+                <a16:creationId xmlns:a16="http://schemas.microsoft.com/office/drawing/2014/main" id="{E2DB4482-B77A-6C31-560C-F8EC60009F53}"/>
+              </a:ext>
+            </a:extLst>
+          </p:cNvPr>
+          <p:cNvSpPr>
+            <a:spLocks noGrp="1"/>
+          </p:cNvSpPr>
+          <p:nvPr>
+            <p:ph type="title"/>
+          </p:nvPr>
+        </p:nvSpPr>
+        <p:spPr/>
+        <p:txBody>
+          <a:bodyPr/>
+          <a:lstStyle/>
+          <a:p>
+            <a:endParaRPr lang="en-US"/>
+          </a:p>
+        </p:txBody>
+      </p:sp>
+      <p:pic>
+        <p:nvPicPr>
+          <p:cNvPr id="5" name="Content Placeholder 4">
+            <a:extLst>
+              <a:ext uri="{FF2B5EF4-FFF2-40B4-BE49-F238E27FC236}">
+                <a16:creationId xmlns:a16="http://schemas.microsoft.com/office/drawing/2014/main" id="{A3A5503D-89C2-4CCD-FCE6-53568BFE8600}"/>
+              </a:ext>
+            </a:extLst>
+          </p:cNvPr>
+          <p:cNvPicPr>
+            <a:picLocks noGrp="1" noChangeAspect="1"/>
+          </p:cNvPicPr>
+          <p:nvPr>
+            <p:ph idx="1"/>
+          </p:nvPr>
+        </p:nvPicPr>
+        <p:blipFill>
+          <a:blip r:embed="rId2"/>
+          <a:stretch>
+            <a:fillRect/>
+          </a:stretch>
+        </p:blipFill>
+        <p:spPr>
+          <a:xfrm>
+            <a:off x="838200" y="1890636"/>
+            <a:ext cx="10515600" cy="4221315"/>
+          </a:xfrm>
+        </p:spPr>
+      </p:pic>
+    </p:spTree>
+    <p:extLst>
+      <p:ext uri="{BB962C8B-B14F-4D97-AF65-F5344CB8AC3E}">
+        <p14:creationId xmlns:p14="http://schemas.microsoft.com/office/powerpoint/2010/main" val="1601540531"/>
+      </p:ext>
+    </p:extLst>
+  </p:cSld>
+  <p:clrMapOvr>
+    <a:masterClrMapping/>
+  </p:clrMapOvr>
+</p:sld>
+</file>
+
+<file path=ppt/slides/slide34.xml><?xml version="1.0" encoding="utf-8"?>
+<p:sld xmlns:a="http://schemas.openxmlformats.org/drawingml/2006/main" xmlns:r="http://schemas.openxmlformats.org/officeDocument/2006/relationships" xmlns:p="http://schemas.openxmlformats.org/presentationml/2006/main">
+  <p:cSld>
+    <p:spTree>
+      <p:nvGrpSpPr>
+        <p:cNvPr id="1" name=""/>
+        <p:cNvGrpSpPr/>
+        <p:nvPr/>
+      </p:nvGrpSpPr>
+      <p:grpSpPr>
+        <a:xfrm>
+          <a:off x="0" y="0"/>
+          <a:ext cx="0" cy="0"/>
+          <a:chOff x="0" y="0"/>
+          <a:chExt cx="0" cy="0"/>
+        </a:xfrm>
+      </p:grpSpPr>
+      <p:sp>
+        <p:nvSpPr>
+          <p:cNvPr id="2" name="Title 1">
+            <a:extLst>
+              <a:ext uri="{FF2B5EF4-FFF2-40B4-BE49-F238E27FC236}">
+                <a16:creationId xmlns:a16="http://schemas.microsoft.com/office/drawing/2014/main" id="{F9C484B9-ADA9-CF40-2AD8-256F7B213087}"/>
+              </a:ext>
+            </a:extLst>
+          </p:cNvPr>
+          <p:cNvSpPr>
+            <a:spLocks noGrp="1"/>
+          </p:cNvSpPr>
+          <p:nvPr>
+            <p:ph type="title"/>
+          </p:nvPr>
+        </p:nvSpPr>
+        <p:spPr/>
+        <p:txBody>
+          <a:bodyPr/>
+          <a:lstStyle/>
+          <a:p>
+            <a:endParaRPr lang="en-US"/>
+          </a:p>
+        </p:txBody>
+      </p:sp>
+      <p:pic>
+        <p:nvPicPr>
+          <p:cNvPr id="5" name="Content Placeholder 4">
+            <a:extLst>
+              <a:ext uri="{FF2B5EF4-FFF2-40B4-BE49-F238E27FC236}">
+                <a16:creationId xmlns:a16="http://schemas.microsoft.com/office/drawing/2014/main" id="{38D772CA-0F26-0DE4-EBB2-196AC7DB6AC6}"/>
+              </a:ext>
+            </a:extLst>
+          </p:cNvPr>
+          <p:cNvPicPr>
+            <a:picLocks noGrp="1" noChangeAspect="1"/>
+          </p:cNvPicPr>
+          <p:nvPr>
+            <p:ph idx="1"/>
+          </p:nvPr>
+        </p:nvPicPr>
+        <p:blipFill>
+          <a:blip r:embed="rId2"/>
+          <a:stretch>
+            <a:fillRect/>
+          </a:stretch>
+        </p:blipFill>
+        <p:spPr>
+          <a:xfrm>
+            <a:off x="838200" y="1872600"/>
+            <a:ext cx="10515600" cy="4257388"/>
+          </a:xfrm>
+        </p:spPr>
+      </p:pic>
+    </p:spTree>
+    <p:extLst>
+      <p:ext uri="{BB962C8B-B14F-4D97-AF65-F5344CB8AC3E}">
+        <p14:creationId xmlns:p14="http://schemas.microsoft.com/office/powerpoint/2010/main" val="1526440202"/>
+      </p:ext>
+    </p:extLst>
+  </p:cSld>
+  <p:clrMapOvr>
+    <a:masterClrMapping/>
+  </p:clrMapOvr>
+</p:sld>
+</file>
+
+<file path=ppt/slides/slide35.xml><?xml version="1.0" encoding="utf-8"?>
+<p:sld xmlns:a="http://schemas.openxmlformats.org/drawingml/2006/main" xmlns:r="http://schemas.openxmlformats.org/officeDocument/2006/relationships" xmlns:p="http://schemas.openxmlformats.org/presentationml/2006/main">
+  <p:cSld>
+    <p:spTree>
+      <p:nvGrpSpPr>
+        <p:cNvPr id="1" name=""/>
+        <p:cNvGrpSpPr/>
+        <p:nvPr/>
+      </p:nvGrpSpPr>
+      <p:grpSpPr>
+        <a:xfrm>
+          <a:off x="0" y="0"/>
+          <a:ext cx="0" cy="0"/>
+          <a:chOff x="0" y="0"/>
+          <a:chExt cx="0" cy="0"/>
+        </a:xfrm>
+      </p:grpSpPr>
+      <p:sp>
+        <p:nvSpPr>
+          <p:cNvPr id="2" name="Title 1">
+            <a:extLst>
+              <a:ext uri="{FF2B5EF4-FFF2-40B4-BE49-F238E27FC236}">
                 <a16:creationId xmlns:a16="http://schemas.microsoft.com/office/drawing/2014/main" id="{72580DF0-2373-C24E-E4F2-8A024282A786}"/>
               </a:ext>
             </a:extLst>
@@ -11622,7 +13113,7 @@
 </p:sld>
 </file>
 
-<file path=ppt/slides/slide33.xml><?xml version="1.0" encoding="utf-8"?>
+<file path=ppt/slides/slide36.xml><?xml version="1.0" encoding="utf-8"?>
 <p:sld xmlns:a="http://schemas.openxmlformats.org/drawingml/2006/main" xmlns:r="http://schemas.openxmlformats.org/officeDocument/2006/relationships" xmlns:p="http://schemas.openxmlformats.org/presentationml/2006/main">
   <p:cSld>
     <p:bg>
@@ -11852,7 +13343,7 @@
 </p:sld>
 </file>
 
-<file path=ppt/slides/slide34.xml><?xml version="1.0" encoding="utf-8"?>
+<file path=ppt/slides/slide37.xml><?xml version="1.0" encoding="utf-8"?>
 <p:sld xmlns:a="http://schemas.openxmlformats.org/drawingml/2006/main" xmlns:r="http://schemas.openxmlformats.org/officeDocument/2006/relationships" xmlns:p="http://schemas.openxmlformats.org/presentationml/2006/main">
   <p:cSld>
     <p:spTree>
@@ -11976,713 +13467,6 @@
     <p:extLst>
       <p:ext uri="{BB962C8B-B14F-4D97-AF65-F5344CB8AC3E}">
         <p14:creationId xmlns:p14="http://schemas.microsoft.com/office/powerpoint/2010/main" val="4085563342"/>
-      </p:ext>
-    </p:extLst>
-  </p:cSld>
-  <p:clrMapOvr>
-    <a:masterClrMapping/>
-  </p:clrMapOvr>
-</p:sld>
-</file>
-
-<file path=ppt/slides/slide35.xml><?xml version="1.0" encoding="utf-8"?>
-<p:sld xmlns:a="http://schemas.openxmlformats.org/drawingml/2006/main" xmlns:r="http://schemas.openxmlformats.org/officeDocument/2006/relationships" xmlns:p="http://schemas.openxmlformats.org/presentationml/2006/main">
-  <p:cSld>
-    <p:bg>
-      <p:bgPr>
-        <a:solidFill>
-          <a:schemeClr val="bg1"/>
-        </a:solidFill>
-        <a:effectLst/>
-      </p:bgPr>
-    </p:bg>
-    <p:spTree>
-      <p:nvGrpSpPr>
-        <p:cNvPr id="1" name=""/>
-        <p:cNvGrpSpPr/>
-        <p:nvPr/>
-      </p:nvGrpSpPr>
-      <p:grpSpPr>
-        <a:xfrm>
-          <a:off x="0" y="0"/>
-          <a:ext cx="0" cy="0"/>
-          <a:chOff x="0" y="0"/>
-          <a:chExt cx="0" cy="0"/>
-        </a:xfrm>
-      </p:grpSpPr>
-      <p:sp useBgFill="1">
-        <p:nvSpPr>
-          <p:cNvPr id="25" name="Rectangle 24">
-            <a:extLst>
-              <a:ext uri="{FF2B5EF4-FFF2-40B4-BE49-F238E27FC236}">
-                <a16:creationId xmlns:a16="http://schemas.microsoft.com/office/drawing/2014/main" id="{99ED5833-B85B-4103-8A3B-CAB0308E6C15}"/>
-              </a:ext>
-              <a:ext uri="{C183D7F6-B498-43B3-948B-1728B52AA6E4}">
-                <adec:decorative xmlns:adec="http://schemas.microsoft.com/office/drawing/2017/decorative" val="1"/>
-              </a:ext>
-            </a:extLst>
-          </p:cNvPr>
-          <p:cNvSpPr>
-            <a:spLocks noGrp="1" noRot="1" noChangeAspect="1" noMove="1" noResize="1" noEditPoints="1" noAdjustHandles="1" noChangeArrowheads="1" noChangeShapeType="1" noTextEdit="1"/>
-          </p:cNvSpPr>
-          <p:nvPr>
-            <p:extLst>
-              <p:ext uri="{386F3935-93C4-4BCD-93E2-E3B085C9AB24}">
-                <p16:designElem xmlns:p16="http://schemas.microsoft.com/office/powerpoint/2015/main" val="1"/>
-              </p:ext>
-            </p:extLst>
-          </p:nvPr>
-        </p:nvSpPr>
-        <p:spPr>
-          <a:xfrm>
-            <a:off x="-1" y="0"/>
-            <a:ext cx="12188952" cy="6858000"/>
-          </a:xfrm>
-          <a:prstGeom prst="rect">
-            <a:avLst/>
-          </a:prstGeom>
-          <a:ln>
-            <a:noFill/>
-          </a:ln>
-        </p:spPr>
-        <p:style>
-          <a:lnRef idx="2">
-            <a:schemeClr val="accent1">
-              <a:shade val="50000"/>
-            </a:schemeClr>
-          </a:lnRef>
-          <a:fillRef idx="1">
-            <a:schemeClr val="accent1"/>
-          </a:fillRef>
-          <a:effectRef idx="0">
-            <a:schemeClr val="accent1"/>
-          </a:effectRef>
-          <a:fontRef idx="minor">
-            <a:schemeClr val="lt1"/>
-          </a:fontRef>
-        </p:style>
-        <p:txBody>
-          <a:bodyPr rtlCol="0" anchor="ctr"/>
-          <a:lstStyle/>
-          <a:p>
-            <a:pPr algn="ctr"/>
-            <a:endParaRPr lang="en-US"/>
-          </a:p>
-        </p:txBody>
-      </p:sp>
-      <p:sp>
-        <p:nvSpPr>
-          <p:cNvPr id="2" name="Title 1">
-            <a:extLst>
-              <a:ext uri="{FF2B5EF4-FFF2-40B4-BE49-F238E27FC236}">
-                <a16:creationId xmlns:a16="http://schemas.microsoft.com/office/drawing/2014/main" id="{3966EEAC-F97C-DA6D-53B4-C6B889E637D9}"/>
-              </a:ext>
-            </a:extLst>
-          </p:cNvPr>
-          <p:cNvSpPr>
-            <a:spLocks noGrp="1"/>
-          </p:cNvSpPr>
-          <p:nvPr>
-            <p:ph type="title"/>
-          </p:nvPr>
-        </p:nvSpPr>
-        <p:spPr>
-          <a:xfrm>
-            <a:off x="1198181" y="560881"/>
-            <a:ext cx="9795638" cy="1114380"/>
-          </a:xfrm>
-        </p:spPr>
-        <p:txBody>
-          <a:bodyPr vert="horz" lIns="91440" tIns="45720" rIns="91440" bIns="45720" rtlCol="0" anchor="b">
-            <a:normAutofit/>
-          </a:bodyPr>
-          <a:lstStyle/>
-          <a:p>
-            <a:pPr algn="ctr"/>
-            <a:r>
-              <a:rPr lang="en-US" sz="3600"/>
-              <a:t>Analysis Approaches – Logistic Regression</a:t>
-            </a:r>
-            <a:br>
-              <a:rPr lang="en-US" sz="3600"/>
-            </a:br>
-            <a:endParaRPr lang="en-US" sz="3600"/>
-          </a:p>
-        </p:txBody>
-      </p:sp>
-      <p:sp>
-        <p:nvSpPr>
-          <p:cNvPr id="7" name="Content Placeholder 6">
-            <a:extLst>
-              <a:ext uri="{FF2B5EF4-FFF2-40B4-BE49-F238E27FC236}">
-                <a16:creationId xmlns:a16="http://schemas.microsoft.com/office/drawing/2014/main" id="{CB70BBAB-F1CA-46E8-BA85-2DBF442BEE98}"/>
-              </a:ext>
-            </a:extLst>
-          </p:cNvPr>
-          <p:cNvSpPr>
-            <a:spLocks noGrp="1"/>
-          </p:cNvSpPr>
-          <p:nvPr>
-            <p:ph idx="1"/>
-          </p:nvPr>
-        </p:nvSpPr>
-        <p:spPr>
-          <a:xfrm>
-            <a:off x="1198181" y="1839595"/>
-            <a:ext cx="9795638" cy="943119"/>
-          </a:xfrm>
-        </p:spPr>
-        <p:txBody>
-          <a:bodyPr vert="horz" lIns="91440" tIns="45720" rIns="91440" bIns="45720" rtlCol="0">
-            <a:normAutofit/>
-          </a:bodyPr>
-          <a:lstStyle/>
-          <a:p>
-            <a:pPr marL="0" indent="0" algn="ctr">
-              <a:buNone/>
-            </a:pPr>
-            <a:r>
-              <a:rPr lang="en-US" sz="2400"/>
-              <a:t>Phone</a:t>
-            </a:r>
-          </a:p>
-        </p:txBody>
-      </p:sp>
-      <p:pic>
-        <p:nvPicPr>
-          <p:cNvPr id="6" name="Picture 5">
-            <a:extLst>
-              <a:ext uri="{FF2B5EF4-FFF2-40B4-BE49-F238E27FC236}">
-                <a16:creationId xmlns:a16="http://schemas.microsoft.com/office/drawing/2014/main" id="{DCB8C139-15A7-5FCA-27CE-F6EDBC2837DA}"/>
-              </a:ext>
-            </a:extLst>
-          </p:cNvPr>
-          <p:cNvPicPr>
-            <a:picLocks noChangeAspect="1"/>
-          </p:cNvPicPr>
-          <p:nvPr/>
-        </p:nvPicPr>
-        <p:blipFill>
-          <a:blip r:embed="rId2"/>
-          <a:stretch>
-            <a:fillRect/>
-          </a:stretch>
-        </p:blipFill>
-        <p:spPr>
-          <a:xfrm>
-            <a:off x="730434" y="2957665"/>
-            <a:ext cx="4729860" cy="3346376"/>
-          </a:xfrm>
-          <a:prstGeom prst="rect">
-            <a:avLst/>
-          </a:prstGeom>
-        </p:spPr>
-      </p:pic>
-      <p:pic>
-        <p:nvPicPr>
-          <p:cNvPr id="4" name="Picture 3">
-            <a:extLst>
-              <a:ext uri="{FF2B5EF4-FFF2-40B4-BE49-F238E27FC236}">
-                <a16:creationId xmlns:a16="http://schemas.microsoft.com/office/drawing/2014/main" id="{144CF0F7-6218-5735-D46A-2D45BF746C1E}"/>
-              </a:ext>
-            </a:extLst>
-          </p:cNvPr>
-          <p:cNvPicPr>
-            <a:picLocks noChangeAspect="1"/>
-          </p:cNvPicPr>
-          <p:nvPr/>
-        </p:nvPicPr>
-        <p:blipFill>
-          <a:blip r:embed="rId3"/>
-          <a:stretch>
-            <a:fillRect/>
-          </a:stretch>
-        </p:blipFill>
-        <p:spPr>
-          <a:xfrm>
-            <a:off x="6614092" y="2957665"/>
-            <a:ext cx="4965087" cy="3346376"/>
-          </a:xfrm>
-          <a:prstGeom prst="rect">
-            <a:avLst/>
-          </a:prstGeom>
-        </p:spPr>
-      </p:pic>
-    </p:spTree>
-    <p:extLst>
-      <p:ext uri="{BB962C8B-B14F-4D97-AF65-F5344CB8AC3E}">
-        <p14:creationId xmlns:p14="http://schemas.microsoft.com/office/powerpoint/2010/main" val="1667471577"/>
-      </p:ext>
-    </p:extLst>
-  </p:cSld>
-  <p:clrMapOvr>
-    <a:masterClrMapping/>
-  </p:clrMapOvr>
-</p:sld>
-</file>
-
-<file path=ppt/slides/slide36.xml><?xml version="1.0" encoding="utf-8"?>
-<p:sld xmlns:a="http://schemas.openxmlformats.org/drawingml/2006/main" xmlns:r="http://schemas.openxmlformats.org/officeDocument/2006/relationships" xmlns:p="http://schemas.openxmlformats.org/presentationml/2006/main">
-  <p:cSld>
-    <p:bg>
-      <p:bgPr>
-        <a:solidFill>
-          <a:schemeClr val="bg1"/>
-        </a:solidFill>
-        <a:effectLst/>
-      </p:bgPr>
-    </p:bg>
-    <p:spTree>
-      <p:nvGrpSpPr>
-        <p:cNvPr id="1" name=""/>
-        <p:cNvGrpSpPr/>
-        <p:nvPr/>
-      </p:nvGrpSpPr>
-      <p:grpSpPr>
-        <a:xfrm>
-          <a:off x="0" y="0"/>
-          <a:ext cx="0" cy="0"/>
-          <a:chOff x="0" y="0"/>
-          <a:chExt cx="0" cy="0"/>
-        </a:xfrm>
-      </p:grpSpPr>
-      <p:sp useBgFill="1">
-        <p:nvSpPr>
-          <p:cNvPr id="35" name="Rectangle 34">
-            <a:extLst>
-              <a:ext uri="{FF2B5EF4-FFF2-40B4-BE49-F238E27FC236}">
-                <a16:creationId xmlns:a16="http://schemas.microsoft.com/office/drawing/2014/main" id="{99ED5833-B85B-4103-8A3B-CAB0308E6C15}"/>
-              </a:ext>
-              <a:ext uri="{C183D7F6-B498-43B3-948B-1728B52AA6E4}">
-                <adec:decorative xmlns:adec="http://schemas.microsoft.com/office/drawing/2017/decorative" val="1"/>
-              </a:ext>
-            </a:extLst>
-          </p:cNvPr>
-          <p:cNvSpPr>
-            <a:spLocks noGrp="1" noRot="1" noChangeAspect="1" noMove="1" noResize="1" noEditPoints="1" noAdjustHandles="1" noChangeArrowheads="1" noChangeShapeType="1" noTextEdit="1"/>
-          </p:cNvSpPr>
-          <p:nvPr>
-            <p:extLst>
-              <p:ext uri="{386F3935-93C4-4BCD-93E2-E3B085C9AB24}">
-                <p16:designElem xmlns:p16="http://schemas.microsoft.com/office/powerpoint/2015/main" val="1"/>
-              </p:ext>
-            </p:extLst>
-          </p:nvPr>
-        </p:nvSpPr>
-        <p:spPr>
-          <a:xfrm>
-            <a:off x="-1" y="0"/>
-            <a:ext cx="12188952" cy="6858000"/>
-          </a:xfrm>
-          <a:prstGeom prst="rect">
-            <a:avLst/>
-          </a:prstGeom>
-          <a:ln>
-            <a:noFill/>
-          </a:ln>
-        </p:spPr>
-        <p:style>
-          <a:lnRef idx="2">
-            <a:schemeClr val="accent1">
-              <a:shade val="50000"/>
-            </a:schemeClr>
-          </a:lnRef>
-          <a:fillRef idx="1">
-            <a:schemeClr val="accent1"/>
-          </a:fillRef>
-          <a:effectRef idx="0">
-            <a:schemeClr val="accent1"/>
-          </a:effectRef>
-          <a:fontRef idx="minor">
-            <a:schemeClr val="lt1"/>
-          </a:fontRef>
-        </p:style>
-        <p:txBody>
-          <a:bodyPr rtlCol="0" anchor="ctr"/>
-          <a:lstStyle/>
-          <a:p>
-            <a:pPr algn="ctr"/>
-            <a:endParaRPr lang="en-US"/>
-          </a:p>
-        </p:txBody>
-      </p:sp>
-      <p:sp>
-        <p:nvSpPr>
-          <p:cNvPr id="2" name="Title 1">
-            <a:extLst>
-              <a:ext uri="{FF2B5EF4-FFF2-40B4-BE49-F238E27FC236}">
-                <a16:creationId xmlns:a16="http://schemas.microsoft.com/office/drawing/2014/main" id="{3966EEAC-F97C-DA6D-53B4-C6B889E637D9}"/>
-              </a:ext>
-            </a:extLst>
-          </p:cNvPr>
-          <p:cNvSpPr>
-            <a:spLocks noGrp="1"/>
-          </p:cNvSpPr>
-          <p:nvPr>
-            <p:ph type="title"/>
-          </p:nvPr>
-        </p:nvSpPr>
-        <p:spPr>
-          <a:xfrm>
-            <a:off x="1198181" y="560881"/>
-            <a:ext cx="9795638" cy="1114380"/>
-          </a:xfrm>
-        </p:spPr>
-        <p:txBody>
-          <a:bodyPr vert="horz" lIns="91440" tIns="45720" rIns="91440" bIns="45720" rtlCol="0" anchor="b">
-            <a:normAutofit/>
-          </a:bodyPr>
-          <a:lstStyle/>
-          <a:p>
-            <a:pPr algn="ctr"/>
-            <a:r>
-              <a:rPr lang="en-US" sz="2100"/>
-              <a:t>Analysis Approaches – Gaussian Naïve Bayes</a:t>
-            </a:r>
-            <a:br>
-              <a:rPr lang="en-US" sz="2100"/>
-            </a:br>
-            <a:br>
-              <a:rPr lang="en-US" sz="2100"/>
-            </a:br>
-            <a:endParaRPr lang="en-US" sz="2100"/>
-          </a:p>
-        </p:txBody>
-      </p:sp>
-      <p:sp>
-        <p:nvSpPr>
-          <p:cNvPr id="7" name="Content Placeholder 6">
-            <a:extLst>
-              <a:ext uri="{FF2B5EF4-FFF2-40B4-BE49-F238E27FC236}">
-                <a16:creationId xmlns:a16="http://schemas.microsoft.com/office/drawing/2014/main" id="{CB70BBAB-F1CA-46E8-BA85-2DBF442BEE98}"/>
-              </a:ext>
-            </a:extLst>
-          </p:cNvPr>
-          <p:cNvSpPr>
-            <a:spLocks noGrp="1"/>
-          </p:cNvSpPr>
-          <p:nvPr>
-            <p:ph idx="1"/>
-          </p:nvPr>
-        </p:nvSpPr>
-        <p:spPr>
-          <a:xfrm>
-            <a:off x="1198181" y="1839595"/>
-            <a:ext cx="9795638" cy="943119"/>
-          </a:xfrm>
-        </p:spPr>
-        <p:txBody>
-          <a:bodyPr vert="horz" lIns="91440" tIns="45720" rIns="91440" bIns="45720" rtlCol="0">
-            <a:normAutofit/>
-          </a:bodyPr>
-          <a:lstStyle/>
-          <a:p>
-            <a:pPr marL="0" indent="0" algn="ctr">
-              <a:buNone/>
-            </a:pPr>
-            <a:r>
-              <a:rPr lang="en-US" sz="2400" dirty="0"/>
-              <a:t>Phone</a:t>
-            </a:r>
-          </a:p>
-        </p:txBody>
-      </p:sp>
-      <p:pic>
-        <p:nvPicPr>
-          <p:cNvPr id="8" name="Picture 7">
-            <a:extLst>
-              <a:ext uri="{FF2B5EF4-FFF2-40B4-BE49-F238E27FC236}">
-                <a16:creationId xmlns:a16="http://schemas.microsoft.com/office/drawing/2014/main" id="{F4197B4D-A579-8283-6234-47DDBC60CC96}"/>
-              </a:ext>
-            </a:extLst>
-          </p:cNvPr>
-          <p:cNvPicPr>
-            <a:picLocks noChangeAspect="1"/>
-          </p:cNvPicPr>
-          <p:nvPr/>
-        </p:nvPicPr>
-        <p:blipFill>
-          <a:blip r:embed="rId2"/>
-          <a:stretch>
-            <a:fillRect/>
-          </a:stretch>
-        </p:blipFill>
-        <p:spPr>
-          <a:xfrm>
-            <a:off x="696529" y="2957665"/>
-            <a:ext cx="4797671" cy="3346376"/>
-          </a:xfrm>
-          <a:prstGeom prst="rect">
-            <a:avLst/>
-          </a:prstGeom>
-        </p:spPr>
-      </p:pic>
-      <p:pic>
-        <p:nvPicPr>
-          <p:cNvPr id="4" name="Picture 3">
-            <a:extLst>
-              <a:ext uri="{FF2B5EF4-FFF2-40B4-BE49-F238E27FC236}">
-                <a16:creationId xmlns:a16="http://schemas.microsoft.com/office/drawing/2014/main" id="{2907F6A4-B41A-CC39-5E33-E805D980BC38}"/>
-              </a:ext>
-            </a:extLst>
-          </p:cNvPr>
-          <p:cNvPicPr>
-            <a:picLocks noChangeAspect="1"/>
-          </p:cNvPicPr>
-          <p:nvPr/>
-        </p:nvPicPr>
-        <p:blipFill>
-          <a:blip r:embed="rId3"/>
-          <a:stretch>
-            <a:fillRect/>
-          </a:stretch>
-        </p:blipFill>
-        <p:spPr>
-          <a:xfrm>
-            <a:off x="6691914" y="2957665"/>
-            <a:ext cx="4809442" cy="3346376"/>
-          </a:xfrm>
-          <a:prstGeom prst="rect">
-            <a:avLst/>
-          </a:prstGeom>
-        </p:spPr>
-      </p:pic>
-    </p:spTree>
-    <p:extLst>
-      <p:ext uri="{BB962C8B-B14F-4D97-AF65-F5344CB8AC3E}">
-        <p14:creationId xmlns:p14="http://schemas.microsoft.com/office/powerpoint/2010/main" val="2675869314"/>
-      </p:ext>
-    </p:extLst>
-  </p:cSld>
-  <p:clrMapOvr>
-    <a:masterClrMapping/>
-  </p:clrMapOvr>
-</p:sld>
-</file>
-
-<file path=ppt/slides/slide37.xml><?xml version="1.0" encoding="utf-8"?>
-<p:sld xmlns:a="http://schemas.openxmlformats.org/drawingml/2006/main" xmlns:r="http://schemas.openxmlformats.org/officeDocument/2006/relationships" xmlns:p="http://schemas.openxmlformats.org/presentationml/2006/main">
-  <p:cSld>
-    <p:bg>
-      <p:bgPr>
-        <a:solidFill>
-          <a:schemeClr val="bg1"/>
-        </a:solidFill>
-        <a:effectLst/>
-      </p:bgPr>
-    </p:bg>
-    <p:spTree>
-      <p:nvGrpSpPr>
-        <p:cNvPr id="1" name=""/>
-        <p:cNvGrpSpPr/>
-        <p:nvPr/>
-      </p:nvGrpSpPr>
-      <p:grpSpPr>
-        <a:xfrm>
-          <a:off x="0" y="0"/>
-          <a:ext cx="0" cy="0"/>
-          <a:chOff x="0" y="0"/>
-          <a:chExt cx="0" cy="0"/>
-        </a:xfrm>
-      </p:grpSpPr>
-      <p:sp useBgFill="1">
-        <p:nvSpPr>
-          <p:cNvPr id="25" name="Rectangle 24">
-            <a:extLst>
-              <a:ext uri="{FF2B5EF4-FFF2-40B4-BE49-F238E27FC236}">
-                <a16:creationId xmlns:a16="http://schemas.microsoft.com/office/drawing/2014/main" id="{99ED5833-B85B-4103-8A3B-CAB0308E6C15}"/>
-              </a:ext>
-              <a:ext uri="{C183D7F6-B498-43B3-948B-1728B52AA6E4}">
-                <adec:decorative xmlns:adec="http://schemas.microsoft.com/office/drawing/2017/decorative" val="1"/>
-              </a:ext>
-            </a:extLst>
-          </p:cNvPr>
-          <p:cNvSpPr>
-            <a:spLocks noGrp="1" noRot="1" noChangeAspect="1" noMove="1" noResize="1" noEditPoints="1" noAdjustHandles="1" noChangeArrowheads="1" noChangeShapeType="1" noTextEdit="1"/>
-          </p:cNvSpPr>
-          <p:nvPr>
-            <p:extLst>
-              <p:ext uri="{386F3935-93C4-4BCD-93E2-E3B085C9AB24}">
-                <p16:designElem xmlns:p16="http://schemas.microsoft.com/office/powerpoint/2015/main" val="1"/>
-              </p:ext>
-            </p:extLst>
-          </p:nvPr>
-        </p:nvSpPr>
-        <p:spPr>
-          <a:xfrm>
-            <a:off x="-1" y="0"/>
-            <a:ext cx="12188952" cy="6858000"/>
-          </a:xfrm>
-          <a:prstGeom prst="rect">
-            <a:avLst/>
-          </a:prstGeom>
-          <a:ln>
-            <a:noFill/>
-          </a:ln>
-        </p:spPr>
-        <p:style>
-          <a:lnRef idx="2">
-            <a:schemeClr val="accent1">
-              <a:shade val="50000"/>
-            </a:schemeClr>
-          </a:lnRef>
-          <a:fillRef idx="1">
-            <a:schemeClr val="accent1"/>
-          </a:fillRef>
-          <a:effectRef idx="0">
-            <a:schemeClr val="accent1"/>
-          </a:effectRef>
-          <a:fontRef idx="minor">
-            <a:schemeClr val="lt1"/>
-          </a:fontRef>
-        </p:style>
-        <p:txBody>
-          <a:bodyPr rtlCol="0" anchor="ctr"/>
-          <a:lstStyle/>
-          <a:p>
-            <a:pPr algn="ctr"/>
-            <a:endParaRPr lang="en-US"/>
-          </a:p>
-        </p:txBody>
-      </p:sp>
-      <p:sp>
-        <p:nvSpPr>
-          <p:cNvPr id="2" name="Title 1">
-            <a:extLst>
-              <a:ext uri="{FF2B5EF4-FFF2-40B4-BE49-F238E27FC236}">
-                <a16:creationId xmlns:a16="http://schemas.microsoft.com/office/drawing/2014/main" id="{3966EEAC-F97C-DA6D-53B4-C6B889E637D9}"/>
-              </a:ext>
-            </a:extLst>
-          </p:cNvPr>
-          <p:cNvSpPr>
-            <a:spLocks noGrp="1"/>
-          </p:cNvSpPr>
-          <p:nvPr>
-            <p:ph type="title"/>
-          </p:nvPr>
-        </p:nvSpPr>
-        <p:spPr>
-          <a:xfrm>
-            <a:off x="1198181" y="560881"/>
-            <a:ext cx="9795638" cy="1114380"/>
-          </a:xfrm>
-        </p:spPr>
-        <p:txBody>
-          <a:bodyPr vert="horz" lIns="91440" tIns="45720" rIns="91440" bIns="45720" rtlCol="0" anchor="b">
-            <a:normAutofit/>
-          </a:bodyPr>
-          <a:lstStyle/>
-          <a:p>
-            <a:pPr algn="ctr"/>
-            <a:r>
-              <a:rPr lang="en-US" sz="5200"/>
-              <a:t>Analysis Approaches – AdaBoost</a:t>
-            </a:r>
-          </a:p>
-        </p:txBody>
-      </p:sp>
-      <p:sp>
-        <p:nvSpPr>
-          <p:cNvPr id="7" name="Content Placeholder 6">
-            <a:extLst>
-              <a:ext uri="{FF2B5EF4-FFF2-40B4-BE49-F238E27FC236}">
-                <a16:creationId xmlns:a16="http://schemas.microsoft.com/office/drawing/2014/main" id="{CB70BBAB-F1CA-46E8-BA85-2DBF442BEE98}"/>
-              </a:ext>
-            </a:extLst>
-          </p:cNvPr>
-          <p:cNvSpPr>
-            <a:spLocks noGrp="1"/>
-          </p:cNvSpPr>
-          <p:nvPr>
-            <p:ph idx="1"/>
-          </p:nvPr>
-        </p:nvSpPr>
-        <p:spPr>
-          <a:xfrm>
-            <a:off x="1198181" y="1839595"/>
-            <a:ext cx="9795638" cy="943119"/>
-          </a:xfrm>
-        </p:spPr>
-        <p:txBody>
-          <a:bodyPr vert="horz" lIns="91440" tIns="45720" rIns="91440" bIns="45720" rtlCol="0">
-            <a:normAutofit/>
-          </a:bodyPr>
-          <a:lstStyle/>
-          <a:p>
-            <a:pPr marL="0" indent="0" algn="ctr">
-              <a:buNone/>
-            </a:pPr>
-            <a:r>
-              <a:rPr lang="en-US" sz="2400"/>
-              <a:t>Phone</a:t>
-            </a:r>
-          </a:p>
-        </p:txBody>
-      </p:sp>
-      <p:pic>
-        <p:nvPicPr>
-          <p:cNvPr id="4" name="Picture 3">
-            <a:extLst>
-              <a:ext uri="{FF2B5EF4-FFF2-40B4-BE49-F238E27FC236}">
-                <a16:creationId xmlns:a16="http://schemas.microsoft.com/office/drawing/2014/main" id="{81DEF3A1-9FA8-02D6-FCF0-3B5D7BFAB524}"/>
-              </a:ext>
-            </a:extLst>
-          </p:cNvPr>
-          <p:cNvPicPr>
-            <a:picLocks noChangeAspect="1"/>
-          </p:cNvPicPr>
-          <p:nvPr/>
-        </p:nvPicPr>
-        <p:blipFill>
-          <a:blip r:embed="rId2"/>
-          <a:stretch>
-            <a:fillRect/>
-          </a:stretch>
-        </p:blipFill>
-        <p:spPr>
-          <a:xfrm>
-            <a:off x="738762" y="2957665"/>
-            <a:ext cx="4713205" cy="3346376"/>
-          </a:xfrm>
-          <a:prstGeom prst="rect">
-            <a:avLst/>
-          </a:prstGeom>
-        </p:spPr>
-      </p:pic>
-      <p:pic>
-        <p:nvPicPr>
-          <p:cNvPr id="9" name="Picture 8">
-            <a:extLst>
-              <a:ext uri="{FF2B5EF4-FFF2-40B4-BE49-F238E27FC236}">
-                <a16:creationId xmlns:a16="http://schemas.microsoft.com/office/drawing/2014/main" id="{2854DEB3-0DF2-F9FA-49A6-0B9C312D80CD}"/>
-              </a:ext>
-            </a:extLst>
-          </p:cNvPr>
-          <p:cNvPicPr>
-            <a:picLocks noChangeAspect="1"/>
-          </p:cNvPicPr>
-          <p:nvPr/>
-        </p:nvPicPr>
-        <p:blipFill>
-          <a:blip r:embed="rId3"/>
-          <a:stretch>
-            <a:fillRect/>
-          </a:stretch>
-        </p:blipFill>
-        <p:spPr>
-          <a:xfrm>
-            <a:off x="6186743" y="2957665"/>
-            <a:ext cx="5819785" cy="3346376"/>
-          </a:xfrm>
-          <a:prstGeom prst="rect">
-            <a:avLst/>
-          </a:prstGeom>
-        </p:spPr>
-      </p:pic>
-    </p:spTree>
-    <p:extLst>
-      <p:ext uri="{BB962C8B-B14F-4D97-AF65-F5344CB8AC3E}">
-        <p14:creationId xmlns:p14="http://schemas.microsoft.com/office/powerpoint/2010/main" val="782100944"/>
       </p:ext>
     </p:extLst>
   </p:cSld>
@@ -12719,7 +13503,7 @@
       </p:grpSpPr>
       <p:sp useBgFill="1">
         <p:nvSpPr>
-          <p:cNvPr id="40" name="Rectangle 39">
+          <p:cNvPr id="25" name="Rectangle 24">
             <a:extLst>
               <a:ext uri="{FF2B5EF4-FFF2-40B4-BE49-F238E27FC236}">
                 <a16:creationId xmlns:a16="http://schemas.microsoft.com/office/drawing/2014/main" id="{99ED5833-B85B-4103-8A3B-CAB0308E6C15}"/>
@@ -12807,16 +13591,13 @@
           <a:p>
             <a:pPr algn="ctr"/>
             <a:r>
-              <a:rPr lang="en-US" sz="2100" dirty="0"/>
-              <a:t>Analysis Approaches – KNN</a:t>
+              <a:rPr lang="en-US" sz="3600"/>
+              <a:t>Analysis Approaches – Logistic Regression</a:t>
             </a:r>
             <a:br>
-              <a:rPr lang="en-US" sz="2100" dirty="0"/>
+              <a:rPr lang="en-US" sz="3600"/>
             </a:br>
-            <a:br>
-              <a:rPr lang="en-US" sz="2100" dirty="0"/>
-            </a:br>
-            <a:endParaRPr lang="en-US" sz="2100" dirty="0"/>
+            <a:endParaRPr lang="en-US" sz="3600"/>
           </a:p>
         </p:txBody>
       </p:sp>
@@ -12852,7 +13633,7 @@
               <a:buNone/>
             </a:pPr>
             <a:r>
-              <a:rPr lang="en-US" sz="2400" dirty="0"/>
+              <a:rPr lang="en-US" sz="2400"/>
               <a:t>Phone</a:t>
             </a:r>
           </a:p>
@@ -12860,10 +13641,10 @@
       </p:sp>
       <p:pic>
         <p:nvPicPr>
-          <p:cNvPr id="9" name="Picture 8">
-            <a:extLst>
-              <a:ext uri="{FF2B5EF4-FFF2-40B4-BE49-F238E27FC236}">
-                <a16:creationId xmlns:a16="http://schemas.microsoft.com/office/drawing/2014/main" id="{C59CAD2D-08E3-1315-8F1B-EE50E9F642DD}"/>
+          <p:cNvPr id="6" name="Picture 5">
+            <a:extLst>
+              <a:ext uri="{FF2B5EF4-FFF2-40B4-BE49-F238E27FC236}">
+                <a16:creationId xmlns:a16="http://schemas.microsoft.com/office/drawing/2014/main" id="{DCB8C139-15A7-5FCA-27CE-F6EDBC2837DA}"/>
               </a:ext>
             </a:extLst>
           </p:cNvPr>
@@ -12880,8 +13661,8 @@
         </p:blipFill>
         <p:spPr>
           <a:xfrm>
-            <a:off x="705096" y="2957665"/>
-            <a:ext cx="4780537" cy="3346376"/>
+            <a:off x="730434" y="2957665"/>
+            <a:ext cx="4729860" cy="3346376"/>
           </a:xfrm>
           <a:prstGeom prst="rect">
             <a:avLst/>
@@ -12890,10 +13671,10 @@
       </p:pic>
       <p:pic>
         <p:nvPicPr>
-          <p:cNvPr id="5" name="Picture 4">
-            <a:extLst>
-              <a:ext uri="{FF2B5EF4-FFF2-40B4-BE49-F238E27FC236}">
-                <a16:creationId xmlns:a16="http://schemas.microsoft.com/office/drawing/2014/main" id="{288F2E5B-421F-CAB7-4CFF-16B989185606}"/>
+          <p:cNvPr id="4" name="Picture 3">
+            <a:extLst>
+              <a:ext uri="{FF2B5EF4-FFF2-40B4-BE49-F238E27FC236}">
+                <a16:creationId xmlns:a16="http://schemas.microsoft.com/office/drawing/2014/main" id="{144CF0F7-6218-5735-D46A-2D45BF746C1E}"/>
               </a:ext>
             </a:extLst>
           </p:cNvPr>
@@ -12910,8 +13691,8 @@
         </p:blipFill>
         <p:spPr>
           <a:xfrm>
-            <a:off x="6217767" y="2957665"/>
-            <a:ext cx="5757736" cy="3346376"/>
+            <a:off x="6614092" y="2957665"/>
+            <a:ext cx="4965087" cy="3346376"/>
           </a:xfrm>
           <a:prstGeom prst="rect">
             <a:avLst/>
@@ -12921,7 +13702,7 @@
     </p:spTree>
     <p:extLst>
       <p:ext uri="{BB962C8B-B14F-4D97-AF65-F5344CB8AC3E}">
-        <p14:creationId xmlns:p14="http://schemas.microsoft.com/office/powerpoint/2010/main" val="1288103707"/>
+        <p14:creationId xmlns:p14="http://schemas.microsoft.com/office/powerpoint/2010/main" val="1667471577"/>
       </p:ext>
     </p:extLst>
   </p:cSld>
@@ -12958,7 +13739,7 @@
       </p:grpSpPr>
       <p:sp useBgFill="1">
         <p:nvSpPr>
-          <p:cNvPr id="45" name="Rectangle 44">
+          <p:cNvPr id="35" name="Rectangle 34">
             <a:extLst>
               <a:ext uri="{FF2B5EF4-FFF2-40B4-BE49-F238E27FC236}">
                 <a16:creationId xmlns:a16="http://schemas.microsoft.com/office/drawing/2014/main" id="{99ED5833-B85B-4103-8A3B-CAB0308E6C15}"/>
@@ -13046,16 +13827,16 @@
           <a:p>
             <a:pPr algn="ctr"/>
             <a:r>
-              <a:rPr lang="en-US" sz="2100" dirty="0"/>
-              <a:t>Analysis Approaches – Decision Tree</a:t>
+              <a:rPr lang="en-US" sz="2100"/>
+              <a:t>Analysis Approaches – Gaussian Naïve Bayes</a:t>
             </a:r>
             <a:br>
-              <a:rPr lang="en-US" sz="2100" dirty="0"/>
+              <a:rPr lang="en-US" sz="2100"/>
             </a:br>
             <a:br>
-              <a:rPr lang="en-US" sz="2100" dirty="0"/>
+              <a:rPr lang="en-US" sz="2100"/>
             </a:br>
-            <a:endParaRPr lang="en-US" sz="2100" dirty="0"/>
+            <a:endParaRPr lang="en-US" sz="2100"/>
           </a:p>
         </p:txBody>
       </p:sp>
@@ -13102,7 +13883,7 @@
           <p:cNvPr id="8" name="Picture 7">
             <a:extLst>
               <a:ext uri="{FF2B5EF4-FFF2-40B4-BE49-F238E27FC236}">
-                <a16:creationId xmlns:a16="http://schemas.microsoft.com/office/drawing/2014/main" id="{996981F4-A0B2-F839-0D26-A31FAA4491D7}"/>
+                <a16:creationId xmlns:a16="http://schemas.microsoft.com/office/drawing/2014/main" id="{F4197B4D-A579-8283-6234-47DDBC60CC96}"/>
               </a:ext>
             </a:extLst>
           </p:cNvPr>
@@ -13119,8 +13900,8 @@
         </p:blipFill>
         <p:spPr>
           <a:xfrm>
-            <a:off x="713602" y="2957665"/>
-            <a:ext cx="4763524" cy="3346376"/>
+            <a:off x="696529" y="2957665"/>
+            <a:ext cx="4797671" cy="3346376"/>
           </a:xfrm>
           <a:prstGeom prst="rect">
             <a:avLst/>
@@ -13132,7 +13913,7 @@
           <p:cNvPr id="4" name="Picture 3">
             <a:extLst>
               <a:ext uri="{FF2B5EF4-FFF2-40B4-BE49-F238E27FC236}">
-                <a16:creationId xmlns:a16="http://schemas.microsoft.com/office/drawing/2014/main" id="{2440F27C-C901-C66A-D429-10912463CA5B}"/>
+                <a16:creationId xmlns:a16="http://schemas.microsoft.com/office/drawing/2014/main" id="{2907F6A4-B41A-CC39-5E33-E805D980BC38}"/>
               </a:ext>
             </a:extLst>
           </p:cNvPr>
@@ -13149,8 +13930,8 @@
         </p:blipFill>
         <p:spPr>
           <a:xfrm>
-            <a:off x="6563398" y="2957665"/>
-            <a:ext cx="5066475" cy="3346376"/>
+            <a:off x="6691914" y="2957665"/>
+            <a:ext cx="4809442" cy="3346376"/>
           </a:xfrm>
           <a:prstGeom prst="rect">
             <a:avLst/>
@@ -13160,7 +13941,7 @@
     </p:spTree>
     <p:extLst>
       <p:ext uri="{BB962C8B-B14F-4D97-AF65-F5344CB8AC3E}">
-        <p14:creationId xmlns:p14="http://schemas.microsoft.com/office/powerpoint/2010/main" val="78353996"/>
+        <p14:creationId xmlns:p14="http://schemas.microsoft.com/office/powerpoint/2010/main" val="2675869314"/>
       </p:ext>
     </p:extLst>
   </p:cSld>
@@ -13335,7 +14116,7 @@
       </p:grpSpPr>
       <p:sp useBgFill="1">
         <p:nvSpPr>
-          <p:cNvPr id="50" name="Rectangle 49">
+          <p:cNvPr id="25" name="Rectangle 24">
             <a:extLst>
               <a:ext uri="{FF2B5EF4-FFF2-40B4-BE49-F238E27FC236}">
                 <a16:creationId xmlns:a16="http://schemas.microsoft.com/office/drawing/2014/main" id="{99ED5833-B85B-4103-8A3B-CAB0308E6C15}"/>
@@ -13423,16 +14204,9 @@
           <a:p>
             <a:pPr algn="ctr"/>
             <a:r>
-              <a:rPr lang="en-US" sz="2100" dirty="0"/>
-              <a:t>Analysis Approaches – Random Forest</a:t>
-            </a:r>
-            <a:br>
-              <a:rPr lang="en-US" sz="2100" dirty="0"/>
-            </a:br>
-            <a:br>
-              <a:rPr lang="en-US" sz="2100" dirty="0"/>
-            </a:br>
-            <a:endParaRPr lang="en-US" sz="2100" dirty="0"/>
+              <a:rPr lang="en-US" sz="5200"/>
+              <a:t>Analysis Approaches – AdaBoost</a:t>
+            </a:r>
           </a:p>
         </p:txBody>
       </p:sp>
@@ -13468,7 +14242,7 @@
               <a:buNone/>
             </a:pPr>
             <a:r>
-              <a:rPr lang="en-US" sz="2400" dirty="0"/>
+              <a:rPr lang="en-US" sz="2400"/>
               <a:t>Phone</a:t>
             </a:r>
           </a:p>
@@ -13476,10 +14250,10 @@
       </p:sp>
       <p:pic>
         <p:nvPicPr>
-          <p:cNvPr id="9" name="Picture 8">
-            <a:extLst>
-              <a:ext uri="{FF2B5EF4-FFF2-40B4-BE49-F238E27FC236}">
-                <a16:creationId xmlns:a16="http://schemas.microsoft.com/office/drawing/2014/main" id="{4557661A-1F6E-FB60-163D-6A9BD910B16E}"/>
+          <p:cNvPr id="4" name="Picture 3">
+            <a:extLst>
+              <a:ext uri="{FF2B5EF4-FFF2-40B4-BE49-F238E27FC236}">
+                <a16:creationId xmlns:a16="http://schemas.microsoft.com/office/drawing/2014/main" id="{81DEF3A1-9FA8-02D6-FCF0-3B5D7BFAB524}"/>
               </a:ext>
             </a:extLst>
           </p:cNvPr>
@@ -13496,8 +14270,8 @@
         </p:blipFill>
         <p:spPr>
           <a:xfrm>
-            <a:off x="679208" y="2957665"/>
-            <a:ext cx="4832312" cy="3346376"/>
+            <a:off x="738762" y="2957665"/>
+            <a:ext cx="4713205" cy="3346376"/>
           </a:xfrm>
           <a:prstGeom prst="rect">
             <a:avLst/>
@@ -13506,10 +14280,10 @@
       </p:pic>
       <p:pic>
         <p:nvPicPr>
-          <p:cNvPr id="5" name="Picture 4">
-            <a:extLst>
-              <a:ext uri="{FF2B5EF4-FFF2-40B4-BE49-F238E27FC236}">
-                <a16:creationId xmlns:a16="http://schemas.microsoft.com/office/drawing/2014/main" id="{6685F910-F8BB-8653-F467-E26D4B42434B}"/>
+          <p:cNvPr id="9" name="Picture 8">
+            <a:extLst>
+              <a:ext uri="{FF2B5EF4-FFF2-40B4-BE49-F238E27FC236}">
+                <a16:creationId xmlns:a16="http://schemas.microsoft.com/office/drawing/2014/main" id="{2854DEB3-0DF2-F9FA-49A6-0B9C312D80CD}"/>
               </a:ext>
             </a:extLst>
           </p:cNvPr>
@@ -13526,8 +14300,8 @@
         </p:blipFill>
         <p:spPr>
           <a:xfrm>
-            <a:off x="6182505" y="3134017"/>
-            <a:ext cx="5828261" cy="2993672"/>
+            <a:off x="6186743" y="2957665"/>
+            <a:ext cx="5819785" cy="3346376"/>
           </a:xfrm>
           <a:prstGeom prst="rect">
             <a:avLst/>
@@ -13537,7 +14311,7 @@
     </p:spTree>
     <p:extLst>
       <p:ext uri="{BB962C8B-B14F-4D97-AF65-F5344CB8AC3E}">
-        <p14:creationId xmlns:p14="http://schemas.microsoft.com/office/powerpoint/2010/main" val="1181812361"/>
+        <p14:creationId xmlns:p14="http://schemas.microsoft.com/office/powerpoint/2010/main" val="782100944"/>
       </p:ext>
     </p:extLst>
   </p:cSld>
@@ -13574,7 +14348,7 @@
       </p:grpSpPr>
       <p:sp useBgFill="1">
         <p:nvSpPr>
-          <p:cNvPr id="35" name="Rectangle 34">
+          <p:cNvPr id="40" name="Rectangle 39">
             <a:extLst>
               <a:ext uri="{FF2B5EF4-FFF2-40B4-BE49-F238E27FC236}">
                 <a16:creationId xmlns:a16="http://schemas.microsoft.com/office/drawing/2014/main" id="{99ED5833-B85B-4103-8A3B-CAB0308E6C15}"/>
@@ -13663,7 +14437,7 @@
             <a:pPr algn="ctr"/>
             <a:r>
               <a:rPr lang="en-US" sz="2100" dirty="0"/>
-              <a:t>Analysis Approaches – Gaussian Naïve Bayes</a:t>
+              <a:t>Analysis Approaches – KNN</a:t>
             </a:r>
             <a:br>
               <a:rPr lang="en-US" sz="2100" dirty="0"/>
@@ -13708,17 +14482,17 @@
             </a:pPr>
             <a:r>
               <a:rPr lang="en-US" sz="2400" dirty="0"/>
-              <a:t>Watch</a:t>
+              <a:t>Phone</a:t>
             </a:r>
           </a:p>
         </p:txBody>
       </p:sp>
       <p:pic>
         <p:nvPicPr>
-          <p:cNvPr id="8" name="Picture 7">
-            <a:extLst>
-              <a:ext uri="{FF2B5EF4-FFF2-40B4-BE49-F238E27FC236}">
-                <a16:creationId xmlns:a16="http://schemas.microsoft.com/office/drawing/2014/main" id="{F4197B4D-A579-8283-6234-47DDBC60CC96}"/>
+          <p:cNvPr id="9" name="Picture 8">
+            <a:extLst>
+              <a:ext uri="{FF2B5EF4-FFF2-40B4-BE49-F238E27FC236}">
+                <a16:creationId xmlns:a16="http://schemas.microsoft.com/office/drawing/2014/main" id="{C59CAD2D-08E3-1315-8F1B-EE50E9F642DD}"/>
               </a:ext>
             </a:extLst>
           </p:cNvPr>
@@ -13735,8 +14509,8 @@
         </p:blipFill>
         <p:spPr>
           <a:xfrm>
-            <a:off x="696529" y="2957665"/>
-            <a:ext cx="4797671" cy="3346376"/>
+            <a:off x="705096" y="2957665"/>
+            <a:ext cx="4780537" cy="3346376"/>
           </a:xfrm>
           <a:prstGeom prst="rect">
             <a:avLst/>
@@ -13745,10 +14519,10 @@
       </p:pic>
       <p:pic>
         <p:nvPicPr>
-          <p:cNvPr id="4" name="Picture 3">
-            <a:extLst>
-              <a:ext uri="{FF2B5EF4-FFF2-40B4-BE49-F238E27FC236}">
-                <a16:creationId xmlns:a16="http://schemas.microsoft.com/office/drawing/2014/main" id="{2907F6A4-B41A-CC39-5E33-E805D980BC38}"/>
+          <p:cNvPr id="5" name="Picture 4">
+            <a:extLst>
+              <a:ext uri="{FF2B5EF4-FFF2-40B4-BE49-F238E27FC236}">
+                <a16:creationId xmlns:a16="http://schemas.microsoft.com/office/drawing/2014/main" id="{288F2E5B-421F-CAB7-4CFF-16B989185606}"/>
               </a:ext>
             </a:extLst>
           </p:cNvPr>
@@ -13765,8 +14539,8 @@
         </p:blipFill>
         <p:spPr>
           <a:xfrm>
-            <a:off x="6691914" y="2957665"/>
-            <a:ext cx="4809442" cy="3346376"/>
+            <a:off x="6217767" y="2957665"/>
+            <a:ext cx="5757736" cy="3346376"/>
           </a:xfrm>
           <a:prstGeom prst="rect">
             <a:avLst/>
@@ -13776,7 +14550,7 @@
     </p:spTree>
     <p:extLst>
       <p:ext uri="{BB962C8B-B14F-4D97-AF65-F5344CB8AC3E}">
-        <p14:creationId xmlns:p14="http://schemas.microsoft.com/office/powerpoint/2010/main" val="2136718071"/>
+        <p14:creationId xmlns:p14="http://schemas.microsoft.com/office/powerpoint/2010/main" val="1288103707"/>
       </p:ext>
     </p:extLst>
   </p:cSld>
@@ -13813,7 +14587,7 @@
       </p:grpSpPr>
       <p:sp useBgFill="1">
         <p:nvSpPr>
-          <p:cNvPr id="30" name="Rectangle 29">
+          <p:cNvPr id="45" name="Rectangle 44">
             <a:extLst>
               <a:ext uri="{FF2B5EF4-FFF2-40B4-BE49-F238E27FC236}">
                 <a16:creationId xmlns:a16="http://schemas.microsoft.com/office/drawing/2014/main" id="{99ED5833-B85B-4103-8A3B-CAB0308E6C15}"/>
@@ -13901,13 +14675,16 @@
           <a:p>
             <a:pPr algn="ctr"/>
             <a:r>
-              <a:rPr lang="en-US" sz="3600"/>
-              <a:t>Analysis Approaches – Logistic Regression</a:t>
+              <a:rPr lang="en-US" sz="2100" dirty="0"/>
+              <a:t>Analysis Approaches – Decision Tree</a:t>
             </a:r>
             <a:br>
-              <a:rPr lang="en-US" sz="3600"/>
+              <a:rPr lang="en-US" sz="2100" dirty="0"/>
             </a:br>
-            <a:endParaRPr lang="en-US" sz="3600"/>
+            <a:br>
+              <a:rPr lang="en-US" sz="2100" dirty="0"/>
+            </a:br>
+            <a:endParaRPr lang="en-US" sz="2100" dirty="0"/>
           </a:p>
         </p:txBody>
       </p:sp>
@@ -13944,17 +14721,17 @@
             </a:pPr>
             <a:r>
               <a:rPr lang="en-US" sz="2400" dirty="0"/>
-              <a:t>Watch</a:t>
+              <a:t>Phone</a:t>
             </a:r>
           </a:p>
         </p:txBody>
       </p:sp>
       <p:pic>
         <p:nvPicPr>
-          <p:cNvPr id="9" name="Picture 8">
-            <a:extLst>
-              <a:ext uri="{FF2B5EF4-FFF2-40B4-BE49-F238E27FC236}">
-                <a16:creationId xmlns:a16="http://schemas.microsoft.com/office/drawing/2014/main" id="{563A81C8-84A0-1891-F6CE-455FEF139FBB}"/>
+          <p:cNvPr id="8" name="Picture 7">
+            <a:extLst>
+              <a:ext uri="{FF2B5EF4-FFF2-40B4-BE49-F238E27FC236}">
+                <a16:creationId xmlns:a16="http://schemas.microsoft.com/office/drawing/2014/main" id="{996981F4-A0B2-F839-0D26-A31FAA4491D7}"/>
               </a:ext>
             </a:extLst>
           </p:cNvPr>
@@ -13971,8 +14748,8 @@
         </p:blipFill>
         <p:spPr>
           <a:xfrm>
-            <a:off x="687900" y="2957665"/>
-            <a:ext cx="4814929" cy="3346376"/>
+            <a:off x="713602" y="2957665"/>
+            <a:ext cx="4763524" cy="3346376"/>
           </a:xfrm>
           <a:prstGeom prst="rect">
             <a:avLst/>
@@ -13981,10 +14758,10 @@
       </p:pic>
       <p:pic>
         <p:nvPicPr>
-          <p:cNvPr id="5" name="Picture 4">
-            <a:extLst>
-              <a:ext uri="{FF2B5EF4-FFF2-40B4-BE49-F238E27FC236}">
-                <a16:creationId xmlns:a16="http://schemas.microsoft.com/office/drawing/2014/main" id="{4102FD85-AC0C-AAC2-0C9E-B2D3078323C5}"/>
+          <p:cNvPr id="4" name="Picture 3">
+            <a:extLst>
+              <a:ext uri="{FF2B5EF4-FFF2-40B4-BE49-F238E27FC236}">
+                <a16:creationId xmlns:a16="http://schemas.microsoft.com/office/drawing/2014/main" id="{2440F27C-C901-C66A-D429-10912463CA5B}"/>
               </a:ext>
             </a:extLst>
           </p:cNvPr>
@@ -14001,8 +14778,8 @@
         </p:blipFill>
         <p:spPr>
           <a:xfrm>
-            <a:off x="6659251" y="2957665"/>
-            <a:ext cx="4874768" cy="3346376"/>
+            <a:off x="6563398" y="2957665"/>
+            <a:ext cx="5066475" cy="3346376"/>
           </a:xfrm>
           <a:prstGeom prst="rect">
             <a:avLst/>
@@ -14012,7 +14789,7 @@
     </p:spTree>
     <p:extLst>
       <p:ext uri="{BB962C8B-B14F-4D97-AF65-F5344CB8AC3E}">
-        <p14:creationId xmlns:p14="http://schemas.microsoft.com/office/powerpoint/2010/main" val="1668763967"/>
+        <p14:creationId xmlns:p14="http://schemas.microsoft.com/office/powerpoint/2010/main" val="78353996"/>
       </p:ext>
     </p:extLst>
   </p:cSld>
@@ -14049,7 +14826,7 @@
       </p:grpSpPr>
       <p:sp useBgFill="1">
         <p:nvSpPr>
-          <p:cNvPr id="25" name="Rectangle 24">
+          <p:cNvPr id="50" name="Rectangle 49">
             <a:extLst>
               <a:ext uri="{FF2B5EF4-FFF2-40B4-BE49-F238E27FC236}">
                 <a16:creationId xmlns:a16="http://schemas.microsoft.com/office/drawing/2014/main" id="{99ED5833-B85B-4103-8A3B-CAB0308E6C15}"/>
@@ -14137,9 +14914,16 @@
           <a:p>
             <a:pPr algn="ctr"/>
             <a:r>
-              <a:rPr lang="en-US" sz="5200"/>
-              <a:t>Analysis Approaches – AdaBoost</a:t>
-            </a:r>
+              <a:rPr lang="en-US" sz="2100" dirty="0"/>
+              <a:t>Analysis Approaches – Random Forest</a:t>
+            </a:r>
+            <a:br>
+              <a:rPr lang="en-US" sz="2100" dirty="0"/>
+            </a:br>
+            <a:br>
+              <a:rPr lang="en-US" sz="2100" dirty="0"/>
+            </a:br>
+            <a:endParaRPr lang="en-US" sz="2100" dirty="0"/>
           </a:p>
         </p:txBody>
       </p:sp>
@@ -14176,17 +14960,17 @@
             </a:pPr>
             <a:r>
               <a:rPr lang="en-US" sz="2400" dirty="0"/>
-              <a:t>watch</a:t>
+              <a:t>Phone</a:t>
             </a:r>
           </a:p>
         </p:txBody>
       </p:sp>
       <p:pic>
         <p:nvPicPr>
-          <p:cNvPr id="5" name="Picture 4">
-            <a:extLst>
-              <a:ext uri="{FF2B5EF4-FFF2-40B4-BE49-F238E27FC236}">
-                <a16:creationId xmlns:a16="http://schemas.microsoft.com/office/drawing/2014/main" id="{C8ABF9EB-4892-9546-F3C6-354F7A951D50}"/>
+          <p:cNvPr id="9" name="Picture 8">
+            <a:extLst>
+              <a:ext uri="{FF2B5EF4-FFF2-40B4-BE49-F238E27FC236}">
+                <a16:creationId xmlns:a16="http://schemas.microsoft.com/office/drawing/2014/main" id="{4557661A-1F6E-FB60-163D-6A9BD910B16E}"/>
               </a:ext>
             </a:extLst>
           </p:cNvPr>
@@ -14203,8 +14987,8 @@
         </p:blipFill>
         <p:spPr>
           <a:xfrm>
-            <a:off x="705096" y="2957665"/>
-            <a:ext cx="4780537" cy="3346376"/>
+            <a:off x="679208" y="2957665"/>
+            <a:ext cx="4832312" cy="3346376"/>
           </a:xfrm>
           <a:prstGeom prst="rect">
             <a:avLst/>
@@ -14213,10 +14997,10 @@
       </p:pic>
       <p:pic>
         <p:nvPicPr>
-          <p:cNvPr id="4" name="Picture 3">
-            <a:extLst>
-              <a:ext uri="{FF2B5EF4-FFF2-40B4-BE49-F238E27FC236}">
-                <a16:creationId xmlns:a16="http://schemas.microsoft.com/office/drawing/2014/main" id="{FE144DB2-B84B-E216-A951-D9D195B1689E}"/>
+          <p:cNvPr id="5" name="Picture 4">
+            <a:extLst>
+              <a:ext uri="{FF2B5EF4-FFF2-40B4-BE49-F238E27FC236}">
+                <a16:creationId xmlns:a16="http://schemas.microsoft.com/office/drawing/2014/main" id="{6685F910-F8BB-8653-F467-E26D4B42434B}"/>
               </a:ext>
             </a:extLst>
           </p:cNvPr>
@@ -14233,8 +15017,8 @@
         </p:blipFill>
         <p:spPr>
           <a:xfrm>
-            <a:off x="6182505" y="2976887"/>
-            <a:ext cx="5828261" cy="3307931"/>
+            <a:off x="6182505" y="3134017"/>
+            <a:ext cx="5828261" cy="2993672"/>
           </a:xfrm>
           <a:prstGeom prst="rect">
             <a:avLst/>
@@ -14244,7 +15028,7 @@
     </p:spTree>
     <p:extLst>
       <p:ext uri="{BB962C8B-B14F-4D97-AF65-F5344CB8AC3E}">
-        <p14:creationId xmlns:p14="http://schemas.microsoft.com/office/powerpoint/2010/main" val="1179493893"/>
+        <p14:creationId xmlns:p14="http://schemas.microsoft.com/office/powerpoint/2010/main" val="1181812361"/>
       </p:ext>
     </p:extLst>
   </p:cSld>
@@ -14281,7 +15065,7 @@
       </p:grpSpPr>
       <p:sp useBgFill="1">
         <p:nvSpPr>
-          <p:cNvPr id="50" name="Rectangle 49">
+          <p:cNvPr id="35" name="Rectangle 34">
             <a:extLst>
               <a:ext uri="{FF2B5EF4-FFF2-40B4-BE49-F238E27FC236}">
                 <a16:creationId xmlns:a16="http://schemas.microsoft.com/office/drawing/2014/main" id="{99ED5833-B85B-4103-8A3B-CAB0308E6C15}"/>
@@ -14370,7 +15154,7 @@
             <a:pPr algn="ctr"/>
             <a:r>
               <a:rPr lang="en-US" sz="2100" dirty="0"/>
-              <a:t>Analysis Approaches – Decision Tree</a:t>
+              <a:t>Analysis Approaches – Gaussian Naïve Bayes</a:t>
             </a:r>
             <a:br>
               <a:rPr lang="en-US" sz="2100" dirty="0"/>
@@ -14422,10 +15206,10 @@
       </p:sp>
       <p:pic>
         <p:nvPicPr>
-          <p:cNvPr id="9" name="Picture 8">
-            <a:extLst>
-              <a:ext uri="{FF2B5EF4-FFF2-40B4-BE49-F238E27FC236}">
-                <a16:creationId xmlns:a16="http://schemas.microsoft.com/office/drawing/2014/main" id="{9F78068E-978B-1C8C-C67E-F604931F6F61}"/>
+          <p:cNvPr id="8" name="Picture 7">
+            <a:extLst>
+              <a:ext uri="{FF2B5EF4-FFF2-40B4-BE49-F238E27FC236}">
+                <a16:creationId xmlns:a16="http://schemas.microsoft.com/office/drawing/2014/main" id="{F4197B4D-A579-8283-6234-47DDBC60CC96}"/>
               </a:ext>
             </a:extLst>
           </p:cNvPr>
@@ -14442,8 +15226,8 @@
         </p:blipFill>
         <p:spPr>
           <a:xfrm>
-            <a:off x="738762" y="2957665"/>
-            <a:ext cx="4713205" cy="3346376"/>
+            <a:off x="696529" y="2957665"/>
+            <a:ext cx="4797671" cy="3346376"/>
           </a:xfrm>
           <a:prstGeom prst="rect">
             <a:avLst/>
@@ -14452,10 +15236,10 @@
       </p:pic>
       <p:pic>
         <p:nvPicPr>
-          <p:cNvPr id="5" name="Picture 4">
-            <a:extLst>
-              <a:ext uri="{FF2B5EF4-FFF2-40B4-BE49-F238E27FC236}">
-                <a16:creationId xmlns:a16="http://schemas.microsoft.com/office/drawing/2014/main" id="{F8805275-A812-FBAF-C596-C5EB39BD3D11}"/>
+          <p:cNvPr id="4" name="Picture 3">
+            <a:extLst>
+              <a:ext uri="{FF2B5EF4-FFF2-40B4-BE49-F238E27FC236}">
+                <a16:creationId xmlns:a16="http://schemas.microsoft.com/office/drawing/2014/main" id="{2907F6A4-B41A-CC39-5E33-E805D980BC38}"/>
               </a:ext>
             </a:extLst>
           </p:cNvPr>
@@ -14472,8 +15256,8 @@
         </p:blipFill>
         <p:spPr>
           <a:xfrm>
-            <a:off x="6614347" y="2957665"/>
-            <a:ext cx="4964576" cy="3346376"/>
+            <a:off x="6691914" y="2957665"/>
+            <a:ext cx="4809442" cy="3346376"/>
           </a:xfrm>
           <a:prstGeom prst="rect">
             <a:avLst/>
@@ -14483,7 +15267,7 @@
     </p:spTree>
     <p:extLst>
       <p:ext uri="{BB962C8B-B14F-4D97-AF65-F5344CB8AC3E}">
-        <p14:creationId xmlns:p14="http://schemas.microsoft.com/office/powerpoint/2010/main" val="1311168324"/>
+        <p14:creationId xmlns:p14="http://schemas.microsoft.com/office/powerpoint/2010/main" val="2136718071"/>
       </p:ext>
     </p:extLst>
   </p:cSld>
@@ -14520,7 +15304,7 @@
       </p:grpSpPr>
       <p:sp useBgFill="1">
         <p:nvSpPr>
-          <p:cNvPr id="45" name="Rectangle 44">
+          <p:cNvPr id="30" name="Rectangle 29">
             <a:extLst>
               <a:ext uri="{FF2B5EF4-FFF2-40B4-BE49-F238E27FC236}">
                 <a16:creationId xmlns:a16="http://schemas.microsoft.com/office/drawing/2014/main" id="{99ED5833-B85B-4103-8A3B-CAB0308E6C15}"/>
@@ -14608,16 +15392,13 @@
           <a:p>
             <a:pPr algn="ctr"/>
             <a:r>
-              <a:rPr lang="en-US" sz="2100" dirty="0"/>
-              <a:t>Analysis Approaches – KNN</a:t>
+              <a:rPr lang="en-US" sz="3600"/>
+              <a:t>Analysis Approaches – Logistic Regression</a:t>
             </a:r>
             <a:br>
-              <a:rPr lang="en-US" sz="2100" dirty="0"/>
+              <a:rPr lang="en-US" sz="3600"/>
             </a:br>
-            <a:br>
-              <a:rPr lang="en-US" sz="2100" dirty="0"/>
-            </a:br>
-            <a:endParaRPr lang="en-US" sz="2100" dirty="0"/>
+            <a:endParaRPr lang="en-US" sz="3600"/>
           </a:p>
         </p:txBody>
       </p:sp>
@@ -14661,10 +15442,10 @@
       </p:sp>
       <p:pic>
         <p:nvPicPr>
-          <p:cNvPr id="5" name="Picture 4">
-            <a:extLst>
-              <a:ext uri="{FF2B5EF4-FFF2-40B4-BE49-F238E27FC236}">
-                <a16:creationId xmlns:a16="http://schemas.microsoft.com/office/drawing/2014/main" id="{DB955996-D83F-A28E-FD97-1826D2E28500}"/>
+          <p:cNvPr id="9" name="Picture 8">
+            <a:extLst>
+              <a:ext uri="{FF2B5EF4-FFF2-40B4-BE49-F238E27FC236}">
+                <a16:creationId xmlns:a16="http://schemas.microsoft.com/office/drawing/2014/main" id="{563A81C8-84A0-1891-F6CE-455FEF139FBB}"/>
               </a:ext>
             </a:extLst>
           </p:cNvPr>
@@ -14681,8 +15462,8 @@
         </p:blipFill>
         <p:spPr>
           <a:xfrm>
-            <a:off x="713602" y="2957665"/>
-            <a:ext cx="4763524" cy="3346376"/>
+            <a:off x="687900" y="2957665"/>
+            <a:ext cx="4814929" cy="3346376"/>
           </a:xfrm>
           <a:prstGeom prst="rect">
             <a:avLst/>
@@ -14691,10 +15472,10 @@
       </p:pic>
       <p:pic>
         <p:nvPicPr>
-          <p:cNvPr id="4" name="Picture 3">
-            <a:extLst>
-              <a:ext uri="{FF2B5EF4-FFF2-40B4-BE49-F238E27FC236}">
-                <a16:creationId xmlns:a16="http://schemas.microsoft.com/office/drawing/2014/main" id="{A0708F6E-9A72-3FD2-58EF-E212AC5E5F3F}"/>
+          <p:cNvPr id="5" name="Picture 4">
+            <a:extLst>
+              <a:ext uri="{FF2B5EF4-FFF2-40B4-BE49-F238E27FC236}">
+                <a16:creationId xmlns:a16="http://schemas.microsoft.com/office/drawing/2014/main" id="{4102FD85-AC0C-AAC2-0C9E-B2D3078323C5}"/>
               </a:ext>
             </a:extLst>
           </p:cNvPr>
@@ -14711,8 +15492,8 @@
         </p:blipFill>
         <p:spPr>
           <a:xfrm>
-            <a:off x="6182505" y="2970029"/>
-            <a:ext cx="5828261" cy="3321647"/>
+            <a:off x="6659251" y="2957665"/>
+            <a:ext cx="4874768" cy="3346376"/>
           </a:xfrm>
           <a:prstGeom prst="rect">
             <a:avLst/>
@@ -14722,7 +15503,7 @@
     </p:spTree>
     <p:extLst>
       <p:ext uri="{BB962C8B-B14F-4D97-AF65-F5344CB8AC3E}">
-        <p14:creationId xmlns:p14="http://schemas.microsoft.com/office/powerpoint/2010/main" val="27699935"/>
+        <p14:creationId xmlns:p14="http://schemas.microsoft.com/office/powerpoint/2010/main" val="1668763967"/>
       </p:ext>
     </p:extLst>
   </p:cSld>
@@ -14759,7 +15540,7 @@
       </p:grpSpPr>
       <p:sp useBgFill="1">
         <p:nvSpPr>
-          <p:cNvPr id="55" name="Rectangle 54">
+          <p:cNvPr id="25" name="Rectangle 24">
             <a:extLst>
               <a:ext uri="{FF2B5EF4-FFF2-40B4-BE49-F238E27FC236}">
                 <a16:creationId xmlns:a16="http://schemas.microsoft.com/office/drawing/2014/main" id="{99ED5833-B85B-4103-8A3B-CAB0308E6C15}"/>
@@ -14847,16 +15628,9 @@
           <a:p>
             <a:pPr algn="ctr"/>
             <a:r>
-              <a:rPr lang="en-US" sz="2100" dirty="0"/>
-              <a:t>Analysis Approaches – Random Forest</a:t>
-            </a:r>
-            <a:br>
-              <a:rPr lang="en-US" sz="2100" dirty="0"/>
-            </a:br>
-            <a:br>
-              <a:rPr lang="en-US" sz="2100" dirty="0"/>
-            </a:br>
-            <a:endParaRPr lang="en-US" sz="2100" dirty="0"/>
+              <a:rPr lang="en-US" sz="5200"/>
+              <a:t>Analysis Approaches – AdaBoost</a:t>
+            </a:r>
           </a:p>
         </p:txBody>
       </p:sp>
@@ -14893,17 +15667,17 @@
             </a:pPr>
             <a:r>
               <a:rPr lang="en-US" sz="2400" dirty="0"/>
-              <a:t>Watch</a:t>
+              <a:t>watch</a:t>
             </a:r>
           </a:p>
         </p:txBody>
       </p:sp>
       <p:pic>
         <p:nvPicPr>
-          <p:cNvPr id="8" name="Picture 7">
-            <a:extLst>
-              <a:ext uri="{FF2B5EF4-FFF2-40B4-BE49-F238E27FC236}">
-                <a16:creationId xmlns:a16="http://schemas.microsoft.com/office/drawing/2014/main" id="{7D2AA8DA-F6B5-53D3-D322-AD6F76BB1237}"/>
+          <p:cNvPr id="5" name="Picture 4">
+            <a:extLst>
+              <a:ext uri="{FF2B5EF4-FFF2-40B4-BE49-F238E27FC236}">
+                <a16:creationId xmlns:a16="http://schemas.microsoft.com/office/drawing/2014/main" id="{C8ABF9EB-4892-9546-F3C6-354F7A951D50}"/>
               </a:ext>
             </a:extLst>
           </p:cNvPr>
@@ -14920,8 +15694,8 @@
         </p:blipFill>
         <p:spPr>
           <a:xfrm>
-            <a:off x="730434" y="2957665"/>
-            <a:ext cx="4729860" cy="3346376"/>
+            <a:off x="705096" y="2957665"/>
+            <a:ext cx="4780537" cy="3346376"/>
           </a:xfrm>
           <a:prstGeom prst="rect">
             <a:avLst/>
@@ -14933,7 +15707,7 @@
           <p:cNvPr id="4" name="Picture 3">
             <a:extLst>
               <a:ext uri="{FF2B5EF4-FFF2-40B4-BE49-F238E27FC236}">
-                <a16:creationId xmlns:a16="http://schemas.microsoft.com/office/drawing/2014/main" id="{A1428457-1C92-B788-26C3-D368DF9C4893}"/>
+                <a16:creationId xmlns:a16="http://schemas.microsoft.com/office/drawing/2014/main" id="{FE144DB2-B84B-E216-A951-D9D195B1689E}"/>
               </a:ext>
             </a:extLst>
           </p:cNvPr>
@@ -14950,8 +15724,8 @@
         </p:blipFill>
         <p:spPr>
           <a:xfrm>
-            <a:off x="6182505" y="3141567"/>
-            <a:ext cx="5828261" cy="2978571"/>
+            <a:off x="6182505" y="2976887"/>
+            <a:ext cx="5828261" cy="3307931"/>
           </a:xfrm>
           <a:prstGeom prst="rect">
             <a:avLst/>
@@ -14961,7 +15735,7 @@
     </p:spTree>
     <p:extLst>
       <p:ext uri="{BB962C8B-B14F-4D97-AF65-F5344CB8AC3E}">
-        <p14:creationId xmlns:p14="http://schemas.microsoft.com/office/powerpoint/2010/main" val="4018798804"/>
+        <p14:creationId xmlns:p14="http://schemas.microsoft.com/office/powerpoint/2010/main" val="1179493893"/>
       </p:ext>
     </p:extLst>
   </p:cSld>
@@ -14974,6 +15748,14 @@
 <file path=ppt/slides/slide47.xml><?xml version="1.0" encoding="utf-8"?>
 <p:sld xmlns:a="http://schemas.openxmlformats.org/drawingml/2006/main" xmlns:r="http://schemas.openxmlformats.org/officeDocument/2006/relationships" xmlns:p="http://schemas.openxmlformats.org/presentationml/2006/main">
   <p:cSld>
+    <p:bg>
+      <p:bgPr>
+        <a:solidFill>
+          <a:schemeClr val="bg1"/>
+        </a:solidFill>
+        <a:effectLst/>
+      </p:bgPr>
+    </p:bg>
     <p:spTree>
       <p:nvGrpSpPr>
         <p:cNvPr id="1" name=""/>
@@ -14988,12 +15770,72 @@
           <a:chExt cx="0" cy="0"/>
         </a:xfrm>
       </p:grpSpPr>
+      <p:sp useBgFill="1">
+        <p:nvSpPr>
+          <p:cNvPr id="50" name="Rectangle 49">
+            <a:extLst>
+              <a:ext uri="{FF2B5EF4-FFF2-40B4-BE49-F238E27FC236}">
+                <a16:creationId xmlns:a16="http://schemas.microsoft.com/office/drawing/2014/main" id="{99ED5833-B85B-4103-8A3B-CAB0308E6C15}"/>
+              </a:ext>
+              <a:ext uri="{C183D7F6-B498-43B3-948B-1728B52AA6E4}">
+                <adec:decorative xmlns:adec="http://schemas.microsoft.com/office/drawing/2017/decorative" val="1"/>
+              </a:ext>
+            </a:extLst>
+          </p:cNvPr>
+          <p:cNvSpPr>
+            <a:spLocks noGrp="1" noRot="1" noChangeAspect="1" noMove="1" noResize="1" noEditPoints="1" noAdjustHandles="1" noChangeArrowheads="1" noChangeShapeType="1" noTextEdit="1"/>
+          </p:cNvSpPr>
+          <p:nvPr>
+            <p:extLst>
+              <p:ext uri="{386F3935-93C4-4BCD-93E2-E3B085C9AB24}">
+                <p16:designElem xmlns:p16="http://schemas.microsoft.com/office/powerpoint/2015/main" val="1"/>
+              </p:ext>
+            </p:extLst>
+          </p:nvPr>
+        </p:nvSpPr>
+        <p:spPr>
+          <a:xfrm>
+            <a:off x="-1" y="0"/>
+            <a:ext cx="12188952" cy="6858000"/>
+          </a:xfrm>
+          <a:prstGeom prst="rect">
+            <a:avLst/>
+          </a:prstGeom>
+          <a:ln>
+            <a:noFill/>
+          </a:ln>
+        </p:spPr>
+        <p:style>
+          <a:lnRef idx="2">
+            <a:schemeClr val="accent1">
+              <a:shade val="50000"/>
+            </a:schemeClr>
+          </a:lnRef>
+          <a:fillRef idx="1">
+            <a:schemeClr val="accent1"/>
+          </a:fillRef>
+          <a:effectRef idx="0">
+            <a:schemeClr val="accent1"/>
+          </a:effectRef>
+          <a:fontRef idx="minor">
+            <a:schemeClr val="lt1"/>
+          </a:fontRef>
+        </p:style>
+        <p:txBody>
+          <a:bodyPr rtlCol="0" anchor="ctr"/>
+          <a:lstStyle/>
+          <a:p>
+            <a:pPr algn="ctr"/>
+            <a:endParaRPr lang="en-US"/>
+          </a:p>
+        </p:txBody>
+      </p:sp>
       <p:sp>
         <p:nvSpPr>
           <p:cNvPr id="2" name="Title 1">
             <a:extLst>
               <a:ext uri="{FF2B5EF4-FFF2-40B4-BE49-F238E27FC236}">
-                <a16:creationId xmlns:a16="http://schemas.microsoft.com/office/drawing/2014/main" id="{61ACFAF2-4815-7C7D-3CDD-3A226EE7872D}"/>
+                <a16:creationId xmlns:a16="http://schemas.microsoft.com/office/drawing/2014/main" id="{3966EEAC-F97C-DA6D-53B4-C6B889E637D9}"/>
               </a:ext>
             </a:extLst>
           </p:cNvPr>
@@ -15004,24 +15846,39 @@
             <p:ph type="title"/>
           </p:nvPr>
         </p:nvSpPr>
-        <p:spPr/>
-        <p:txBody>
-          <a:bodyPr/>
-          <a:lstStyle/>
-          <a:p>
-            <a:r>
-              <a:rPr lang="en-US" dirty="0"/>
-              <a:t>Challenges and Approaches</a:t>
-            </a:r>
-          </a:p>
-        </p:txBody>
-      </p:sp>
-      <p:sp>
-        <p:nvSpPr>
-          <p:cNvPr id="3" name="Text Placeholder 2">
-            <a:extLst>
-              <a:ext uri="{FF2B5EF4-FFF2-40B4-BE49-F238E27FC236}">
-                <a16:creationId xmlns:a16="http://schemas.microsoft.com/office/drawing/2014/main" id="{19D36134-935B-DDC7-EA80-80E8990AC7DB}"/>
+        <p:spPr>
+          <a:xfrm>
+            <a:off x="1198181" y="560881"/>
+            <a:ext cx="9795638" cy="1114380"/>
+          </a:xfrm>
+        </p:spPr>
+        <p:txBody>
+          <a:bodyPr vert="horz" lIns="91440" tIns="45720" rIns="91440" bIns="45720" rtlCol="0" anchor="b">
+            <a:normAutofit/>
+          </a:bodyPr>
+          <a:lstStyle/>
+          <a:p>
+            <a:pPr algn="ctr"/>
+            <a:r>
+              <a:rPr lang="en-US" sz="2100" dirty="0"/>
+              <a:t>Analysis Approaches – Decision Tree</a:t>
+            </a:r>
+            <a:br>
+              <a:rPr lang="en-US" sz="2100" dirty="0"/>
+            </a:br>
+            <a:br>
+              <a:rPr lang="en-US" sz="2100" dirty="0"/>
+            </a:br>
+            <a:endParaRPr lang="en-US" sz="2100" dirty="0"/>
+          </a:p>
+        </p:txBody>
+      </p:sp>
+      <p:sp>
+        <p:nvSpPr>
+          <p:cNvPr id="7" name="Content Placeholder 6">
+            <a:extLst>
+              <a:ext uri="{FF2B5EF4-FFF2-40B4-BE49-F238E27FC236}">
+                <a16:creationId xmlns:a16="http://schemas.microsoft.com/office/drawing/2014/main" id="{CB70BBAB-F1CA-46E8-BA85-2DBF442BEE98}"/>
               </a:ext>
             </a:extLst>
           </p:cNvPr>
@@ -15029,22 +15886,95 @@
             <a:spLocks noGrp="1"/>
           </p:cNvSpPr>
           <p:nvPr>
-            <p:ph type="body" idx="1"/>
-          </p:nvPr>
-        </p:nvSpPr>
-        <p:spPr/>
-        <p:txBody>
-          <a:bodyPr/>
-          <a:lstStyle/>
-          <a:p>
-            <a:endParaRPr lang="en-US" dirty="0"/>
-          </a:p>
-        </p:txBody>
-      </p:sp>
+            <p:ph idx="1"/>
+          </p:nvPr>
+        </p:nvSpPr>
+        <p:spPr>
+          <a:xfrm>
+            <a:off x="1198181" y="1839595"/>
+            <a:ext cx="9795638" cy="943119"/>
+          </a:xfrm>
+        </p:spPr>
+        <p:txBody>
+          <a:bodyPr vert="horz" lIns="91440" tIns="45720" rIns="91440" bIns="45720" rtlCol="0">
+            <a:normAutofit/>
+          </a:bodyPr>
+          <a:lstStyle/>
+          <a:p>
+            <a:pPr marL="0" indent="0" algn="ctr">
+              <a:buNone/>
+            </a:pPr>
+            <a:r>
+              <a:rPr lang="en-US" sz="2400" dirty="0"/>
+              <a:t>Watch</a:t>
+            </a:r>
+          </a:p>
+        </p:txBody>
+      </p:sp>
+      <p:pic>
+        <p:nvPicPr>
+          <p:cNvPr id="9" name="Picture 8">
+            <a:extLst>
+              <a:ext uri="{FF2B5EF4-FFF2-40B4-BE49-F238E27FC236}">
+                <a16:creationId xmlns:a16="http://schemas.microsoft.com/office/drawing/2014/main" id="{9F78068E-978B-1C8C-C67E-F604931F6F61}"/>
+              </a:ext>
+            </a:extLst>
+          </p:cNvPr>
+          <p:cNvPicPr>
+            <a:picLocks noChangeAspect="1"/>
+          </p:cNvPicPr>
+          <p:nvPr/>
+        </p:nvPicPr>
+        <p:blipFill>
+          <a:blip r:embed="rId2"/>
+          <a:stretch>
+            <a:fillRect/>
+          </a:stretch>
+        </p:blipFill>
+        <p:spPr>
+          <a:xfrm>
+            <a:off x="738762" y="2957665"/>
+            <a:ext cx="4713205" cy="3346376"/>
+          </a:xfrm>
+          <a:prstGeom prst="rect">
+            <a:avLst/>
+          </a:prstGeom>
+        </p:spPr>
+      </p:pic>
+      <p:pic>
+        <p:nvPicPr>
+          <p:cNvPr id="5" name="Picture 4">
+            <a:extLst>
+              <a:ext uri="{FF2B5EF4-FFF2-40B4-BE49-F238E27FC236}">
+                <a16:creationId xmlns:a16="http://schemas.microsoft.com/office/drawing/2014/main" id="{F8805275-A812-FBAF-C596-C5EB39BD3D11}"/>
+              </a:ext>
+            </a:extLst>
+          </p:cNvPr>
+          <p:cNvPicPr>
+            <a:picLocks noChangeAspect="1"/>
+          </p:cNvPicPr>
+          <p:nvPr/>
+        </p:nvPicPr>
+        <p:blipFill>
+          <a:blip r:embed="rId3"/>
+          <a:stretch>
+            <a:fillRect/>
+          </a:stretch>
+        </p:blipFill>
+        <p:spPr>
+          <a:xfrm>
+            <a:off x="6614347" y="2957665"/>
+            <a:ext cx="4964576" cy="3346376"/>
+          </a:xfrm>
+          <a:prstGeom prst="rect">
+            <a:avLst/>
+          </a:prstGeom>
+        </p:spPr>
+      </p:pic>
     </p:spTree>
     <p:extLst>
       <p:ext uri="{BB962C8B-B14F-4D97-AF65-F5344CB8AC3E}">
-        <p14:creationId xmlns:p14="http://schemas.microsoft.com/office/powerpoint/2010/main" val="3647898038"/>
+        <p14:creationId xmlns:p14="http://schemas.microsoft.com/office/powerpoint/2010/main" val="1311168324"/>
       </p:ext>
     </p:extLst>
   </p:cSld>
@@ -15057,6 +15987,14 @@
 <file path=ppt/slides/slide48.xml><?xml version="1.0" encoding="utf-8"?>
 <p:sld xmlns:a="http://schemas.openxmlformats.org/drawingml/2006/main" xmlns:r="http://schemas.openxmlformats.org/officeDocument/2006/relationships" xmlns:p="http://schemas.openxmlformats.org/presentationml/2006/main">
   <p:cSld>
+    <p:bg>
+      <p:bgPr>
+        <a:solidFill>
+          <a:schemeClr val="bg1"/>
+        </a:solidFill>
+        <a:effectLst/>
+      </p:bgPr>
+    </p:bg>
     <p:spTree>
       <p:nvGrpSpPr>
         <p:cNvPr id="1" name=""/>
@@ -15071,12 +16009,72 @@
           <a:chExt cx="0" cy="0"/>
         </a:xfrm>
       </p:grpSpPr>
+      <p:sp useBgFill="1">
+        <p:nvSpPr>
+          <p:cNvPr id="45" name="Rectangle 44">
+            <a:extLst>
+              <a:ext uri="{FF2B5EF4-FFF2-40B4-BE49-F238E27FC236}">
+                <a16:creationId xmlns:a16="http://schemas.microsoft.com/office/drawing/2014/main" id="{99ED5833-B85B-4103-8A3B-CAB0308E6C15}"/>
+              </a:ext>
+              <a:ext uri="{C183D7F6-B498-43B3-948B-1728B52AA6E4}">
+                <adec:decorative xmlns:adec="http://schemas.microsoft.com/office/drawing/2017/decorative" val="1"/>
+              </a:ext>
+            </a:extLst>
+          </p:cNvPr>
+          <p:cNvSpPr>
+            <a:spLocks noGrp="1" noRot="1" noChangeAspect="1" noMove="1" noResize="1" noEditPoints="1" noAdjustHandles="1" noChangeArrowheads="1" noChangeShapeType="1" noTextEdit="1"/>
+          </p:cNvSpPr>
+          <p:nvPr>
+            <p:extLst>
+              <p:ext uri="{386F3935-93C4-4BCD-93E2-E3B085C9AB24}">
+                <p16:designElem xmlns:p16="http://schemas.microsoft.com/office/powerpoint/2015/main" val="1"/>
+              </p:ext>
+            </p:extLst>
+          </p:nvPr>
+        </p:nvSpPr>
+        <p:spPr>
+          <a:xfrm>
+            <a:off x="-1" y="0"/>
+            <a:ext cx="12188952" cy="6858000"/>
+          </a:xfrm>
+          <a:prstGeom prst="rect">
+            <a:avLst/>
+          </a:prstGeom>
+          <a:ln>
+            <a:noFill/>
+          </a:ln>
+        </p:spPr>
+        <p:style>
+          <a:lnRef idx="2">
+            <a:schemeClr val="accent1">
+              <a:shade val="50000"/>
+            </a:schemeClr>
+          </a:lnRef>
+          <a:fillRef idx="1">
+            <a:schemeClr val="accent1"/>
+          </a:fillRef>
+          <a:effectRef idx="0">
+            <a:schemeClr val="accent1"/>
+          </a:effectRef>
+          <a:fontRef idx="minor">
+            <a:schemeClr val="lt1"/>
+          </a:fontRef>
+        </p:style>
+        <p:txBody>
+          <a:bodyPr rtlCol="0" anchor="ctr"/>
+          <a:lstStyle/>
+          <a:p>
+            <a:pPr algn="ctr"/>
+            <a:endParaRPr lang="en-US"/>
+          </a:p>
+        </p:txBody>
+      </p:sp>
       <p:sp>
         <p:nvSpPr>
           <p:cNvPr id="2" name="Title 1">
             <a:extLst>
               <a:ext uri="{FF2B5EF4-FFF2-40B4-BE49-F238E27FC236}">
-                <a16:creationId xmlns:a16="http://schemas.microsoft.com/office/drawing/2014/main" id="{8791DE50-7547-C314-242B-A61CE5466798}"/>
+                <a16:creationId xmlns:a16="http://schemas.microsoft.com/office/drawing/2014/main" id="{3966EEAC-F97C-DA6D-53B4-C6B889E637D9}"/>
               </a:ext>
             </a:extLst>
           </p:cNvPr>
@@ -15087,24 +16085,39 @@
             <p:ph type="title"/>
           </p:nvPr>
         </p:nvSpPr>
-        <p:spPr/>
-        <p:txBody>
-          <a:bodyPr/>
-          <a:lstStyle/>
-          <a:p>
-            <a:r>
-              <a:rPr lang="en-US" dirty="0"/>
-              <a:t>Challenges and Approaches</a:t>
-            </a:r>
-          </a:p>
-        </p:txBody>
-      </p:sp>
-      <p:sp>
-        <p:nvSpPr>
-          <p:cNvPr id="3" name="Content Placeholder 2">
-            <a:extLst>
-              <a:ext uri="{FF2B5EF4-FFF2-40B4-BE49-F238E27FC236}">
-                <a16:creationId xmlns:a16="http://schemas.microsoft.com/office/drawing/2014/main" id="{E3DD0EBC-B2B3-215D-66AC-D307CB092F12}"/>
+        <p:spPr>
+          <a:xfrm>
+            <a:off x="1198181" y="560881"/>
+            <a:ext cx="9795638" cy="1114380"/>
+          </a:xfrm>
+        </p:spPr>
+        <p:txBody>
+          <a:bodyPr vert="horz" lIns="91440" tIns="45720" rIns="91440" bIns="45720" rtlCol="0" anchor="b">
+            <a:normAutofit/>
+          </a:bodyPr>
+          <a:lstStyle/>
+          <a:p>
+            <a:pPr algn="ctr"/>
+            <a:r>
+              <a:rPr lang="en-US" sz="2100" dirty="0"/>
+              <a:t>Analysis Approaches – KNN</a:t>
+            </a:r>
+            <a:br>
+              <a:rPr lang="en-US" sz="2100" dirty="0"/>
+            </a:br>
+            <a:br>
+              <a:rPr lang="en-US" sz="2100" dirty="0"/>
+            </a:br>
+            <a:endParaRPr lang="en-US" sz="2100" dirty="0"/>
+          </a:p>
+        </p:txBody>
+      </p:sp>
+      <p:sp>
+        <p:nvSpPr>
+          <p:cNvPr id="7" name="Content Placeholder 6">
+            <a:extLst>
+              <a:ext uri="{FF2B5EF4-FFF2-40B4-BE49-F238E27FC236}">
+                <a16:creationId xmlns:a16="http://schemas.microsoft.com/office/drawing/2014/main" id="{CB70BBAB-F1CA-46E8-BA85-2DBF442BEE98}"/>
               </a:ext>
             </a:extLst>
           </p:cNvPr>
@@ -15115,32 +16128,331 @@
             <p:ph idx="1"/>
           </p:nvPr>
         </p:nvSpPr>
-        <p:spPr/>
-        <p:txBody>
-          <a:bodyPr/>
-          <a:lstStyle/>
-          <a:p>
-            <a:r>
-              <a:rPr lang="en-US" dirty="0"/>
-              <a:t>While the phone and watch both had the best results for random forest, the phone was much more accurate. We will have to learn how to leverage the scores from both devices to make the best prediction</a:t>
-            </a:r>
-          </a:p>
-          <a:p>
-            <a:r>
-              <a:rPr lang="en-US" dirty="0"/>
-              <a:t>Also, grouping by 3 seconds might not be the best aggregation</a:t>
-            </a:r>
-          </a:p>
-          <a:p>
-            <a:pPr lvl="1"/>
-            <a:endParaRPr lang="en-US" dirty="0"/>
-          </a:p>
-        </p:txBody>
-      </p:sp>
+        <p:spPr>
+          <a:xfrm>
+            <a:off x="1198181" y="1839595"/>
+            <a:ext cx="9795638" cy="943119"/>
+          </a:xfrm>
+        </p:spPr>
+        <p:txBody>
+          <a:bodyPr vert="horz" lIns="91440" tIns="45720" rIns="91440" bIns="45720" rtlCol="0">
+            <a:normAutofit/>
+          </a:bodyPr>
+          <a:lstStyle/>
+          <a:p>
+            <a:pPr marL="0" indent="0" algn="ctr">
+              <a:buNone/>
+            </a:pPr>
+            <a:r>
+              <a:rPr lang="en-US" sz="2400" dirty="0"/>
+              <a:t>Watch</a:t>
+            </a:r>
+          </a:p>
+        </p:txBody>
+      </p:sp>
+      <p:pic>
+        <p:nvPicPr>
+          <p:cNvPr id="5" name="Picture 4">
+            <a:extLst>
+              <a:ext uri="{FF2B5EF4-FFF2-40B4-BE49-F238E27FC236}">
+                <a16:creationId xmlns:a16="http://schemas.microsoft.com/office/drawing/2014/main" id="{DB955996-D83F-A28E-FD97-1826D2E28500}"/>
+              </a:ext>
+            </a:extLst>
+          </p:cNvPr>
+          <p:cNvPicPr>
+            <a:picLocks noChangeAspect="1"/>
+          </p:cNvPicPr>
+          <p:nvPr/>
+        </p:nvPicPr>
+        <p:blipFill>
+          <a:blip r:embed="rId2"/>
+          <a:stretch>
+            <a:fillRect/>
+          </a:stretch>
+        </p:blipFill>
+        <p:spPr>
+          <a:xfrm>
+            <a:off x="713602" y="2957665"/>
+            <a:ext cx="4763524" cy="3346376"/>
+          </a:xfrm>
+          <a:prstGeom prst="rect">
+            <a:avLst/>
+          </a:prstGeom>
+        </p:spPr>
+      </p:pic>
+      <p:pic>
+        <p:nvPicPr>
+          <p:cNvPr id="4" name="Picture 3">
+            <a:extLst>
+              <a:ext uri="{FF2B5EF4-FFF2-40B4-BE49-F238E27FC236}">
+                <a16:creationId xmlns:a16="http://schemas.microsoft.com/office/drawing/2014/main" id="{A0708F6E-9A72-3FD2-58EF-E212AC5E5F3F}"/>
+              </a:ext>
+            </a:extLst>
+          </p:cNvPr>
+          <p:cNvPicPr>
+            <a:picLocks noChangeAspect="1"/>
+          </p:cNvPicPr>
+          <p:nvPr/>
+        </p:nvPicPr>
+        <p:blipFill>
+          <a:blip r:embed="rId3"/>
+          <a:stretch>
+            <a:fillRect/>
+          </a:stretch>
+        </p:blipFill>
+        <p:spPr>
+          <a:xfrm>
+            <a:off x="6182505" y="2970029"/>
+            <a:ext cx="5828261" cy="3321647"/>
+          </a:xfrm>
+          <a:prstGeom prst="rect">
+            <a:avLst/>
+          </a:prstGeom>
+        </p:spPr>
+      </p:pic>
     </p:spTree>
     <p:extLst>
       <p:ext uri="{BB962C8B-B14F-4D97-AF65-F5344CB8AC3E}">
-        <p14:creationId xmlns:p14="http://schemas.microsoft.com/office/powerpoint/2010/main" val="1961836344"/>
+        <p14:creationId xmlns:p14="http://schemas.microsoft.com/office/powerpoint/2010/main" val="27699935"/>
+      </p:ext>
+    </p:extLst>
+  </p:cSld>
+  <p:clrMapOvr>
+    <a:masterClrMapping/>
+  </p:clrMapOvr>
+</p:sld>
+</file>
+
+<file path=ppt/slides/slide49.xml><?xml version="1.0" encoding="utf-8"?>
+<p:sld xmlns:a="http://schemas.openxmlformats.org/drawingml/2006/main" xmlns:r="http://schemas.openxmlformats.org/officeDocument/2006/relationships" xmlns:p="http://schemas.openxmlformats.org/presentationml/2006/main">
+  <p:cSld>
+    <p:bg>
+      <p:bgPr>
+        <a:solidFill>
+          <a:schemeClr val="bg1"/>
+        </a:solidFill>
+        <a:effectLst/>
+      </p:bgPr>
+    </p:bg>
+    <p:spTree>
+      <p:nvGrpSpPr>
+        <p:cNvPr id="1" name=""/>
+        <p:cNvGrpSpPr/>
+        <p:nvPr/>
+      </p:nvGrpSpPr>
+      <p:grpSpPr>
+        <a:xfrm>
+          <a:off x="0" y="0"/>
+          <a:ext cx="0" cy="0"/>
+          <a:chOff x="0" y="0"/>
+          <a:chExt cx="0" cy="0"/>
+        </a:xfrm>
+      </p:grpSpPr>
+      <p:sp useBgFill="1">
+        <p:nvSpPr>
+          <p:cNvPr id="55" name="Rectangle 54">
+            <a:extLst>
+              <a:ext uri="{FF2B5EF4-FFF2-40B4-BE49-F238E27FC236}">
+                <a16:creationId xmlns:a16="http://schemas.microsoft.com/office/drawing/2014/main" id="{99ED5833-B85B-4103-8A3B-CAB0308E6C15}"/>
+              </a:ext>
+              <a:ext uri="{C183D7F6-B498-43B3-948B-1728B52AA6E4}">
+                <adec:decorative xmlns:adec="http://schemas.microsoft.com/office/drawing/2017/decorative" val="1"/>
+              </a:ext>
+            </a:extLst>
+          </p:cNvPr>
+          <p:cNvSpPr>
+            <a:spLocks noGrp="1" noRot="1" noChangeAspect="1" noMove="1" noResize="1" noEditPoints="1" noAdjustHandles="1" noChangeArrowheads="1" noChangeShapeType="1" noTextEdit="1"/>
+          </p:cNvSpPr>
+          <p:nvPr>
+            <p:extLst>
+              <p:ext uri="{386F3935-93C4-4BCD-93E2-E3B085C9AB24}">
+                <p16:designElem xmlns:p16="http://schemas.microsoft.com/office/powerpoint/2015/main" val="1"/>
+              </p:ext>
+            </p:extLst>
+          </p:nvPr>
+        </p:nvSpPr>
+        <p:spPr>
+          <a:xfrm>
+            <a:off x="-1" y="0"/>
+            <a:ext cx="12188952" cy="6858000"/>
+          </a:xfrm>
+          <a:prstGeom prst="rect">
+            <a:avLst/>
+          </a:prstGeom>
+          <a:ln>
+            <a:noFill/>
+          </a:ln>
+        </p:spPr>
+        <p:style>
+          <a:lnRef idx="2">
+            <a:schemeClr val="accent1">
+              <a:shade val="50000"/>
+            </a:schemeClr>
+          </a:lnRef>
+          <a:fillRef idx="1">
+            <a:schemeClr val="accent1"/>
+          </a:fillRef>
+          <a:effectRef idx="0">
+            <a:schemeClr val="accent1"/>
+          </a:effectRef>
+          <a:fontRef idx="minor">
+            <a:schemeClr val="lt1"/>
+          </a:fontRef>
+        </p:style>
+        <p:txBody>
+          <a:bodyPr rtlCol="0" anchor="ctr"/>
+          <a:lstStyle/>
+          <a:p>
+            <a:pPr algn="ctr"/>
+            <a:endParaRPr lang="en-US"/>
+          </a:p>
+        </p:txBody>
+      </p:sp>
+      <p:sp>
+        <p:nvSpPr>
+          <p:cNvPr id="2" name="Title 1">
+            <a:extLst>
+              <a:ext uri="{FF2B5EF4-FFF2-40B4-BE49-F238E27FC236}">
+                <a16:creationId xmlns:a16="http://schemas.microsoft.com/office/drawing/2014/main" id="{3966EEAC-F97C-DA6D-53B4-C6B889E637D9}"/>
+              </a:ext>
+            </a:extLst>
+          </p:cNvPr>
+          <p:cNvSpPr>
+            <a:spLocks noGrp="1"/>
+          </p:cNvSpPr>
+          <p:nvPr>
+            <p:ph type="title"/>
+          </p:nvPr>
+        </p:nvSpPr>
+        <p:spPr>
+          <a:xfrm>
+            <a:off x="1198181" y="560881"/>
+            <a:ext cx="9795638" cy="1114380"/>
+          </a:xfrm>
+        </p:spPr>
+        <p:txBody>
+          <a:bodyPr vert="horz" lIns="91440" tIns="45720" rIns="91440" bIns="45720" rtlCol="0" anchor="b">
+            <a:normAutofit/>
+          </a:bodyPr>
+          <a:lstStyle/>
+          <a:p>
+            <a:pPr algn="ctr"/>
+            <a:r>
+              <a:rPr lang="en-US" sz="2100" dirty="0"/>
+              <a:t>Analysis Approaches – Random Forest</a:t>
+            </a:r>
+            <a:br>
+              <a:rPr lang="en-US" sz="2100" dirty="0"/>
+            </a:br>
+            <a:br>
+              <a:rPr lang="en-US" sz="2100" dirty="0"/>
+            </a:br>
+            <a:endParaRPr lang="en-US" sz="2100" dirty="0"/>
+          </a:p>
+        </p:txBody>
+      </p:sp>
+      <p:sp>
+        <p:nvSpPr>
+          <p:cNvPr id="7" name="Content Placeholder 6">
+            <a:extLst>
+              <a:ext uri="{FF2B5EF4-FFF2-40B4-BE49-F238E27FC236}">
+                <a16:creationId xmlns:a16="http://schemas.microsoft.com/office/drawing/2014/main" id="{CB70BBAB-F1CA-46E8-BA85-2DBF442BEE98}"/>
+              </a:ext>
+            </a:extLst>
+          </p:cNvPr>
+          <p:cNvSpPr>
+            <a:spLocks noGrp="1"/>
+          </p:cNvSpPr>
+          <p:nvPr>
+            <p:ph idx="1"/>
+          </p:nvPr>
+        </p:nvSpPr>
+        <p:spPr>
+          <a:xfrm>
+            <a:off x="1198181" y="1839595"/>
+            <a:ext cx="9795638" cy="943119"/>
+          </a:xfrm>
+        </p:spPr>
+        <p:txBody>
+          <a:bodyPr vert="horz" lIns="91440" tIns="45720" rIns="91440" bIns="45720" rtlCol="0">
+            <a:normAutofit/>
+          </a:bodyPr>
+          <a:lstStyle/>
+          <a:p>
+            <a:pPr marL="0" indent="0" algn="ctr">
+              <a:buNone/>
+            </a:pPr>
+            <a:r>
+              <a:rPr lang="en-US" sz="2400" dirty="0"/>
+              <a:t>Watch</a:t>
+            </a:r>
+          </a:p>
+        </p:txBody>
+      </p:sp>
+      <p:pic>
+        <p:nvPicPr>
+          <p:cNvPr id="8" name="Picture 7">
+            <a:extLst>
+              <a:ext uri="{FF2B5EF4-FFF2-40B4-BE49-F238E27FC236}">
+                <a16:creationId xmlns:a16="http://schemas.microsoft.com/office/drawing/2014/main" id="{7D2AA8DA-F6B5-53D3-D322-AD6F76BB1237}"/>
+              </a:ext>
+            </a:extLst>
+          </p:cNvPr>
+          <p:cNvPicPr>
+            <a:picLocks noChangeAspect="1"/>
+          </p:cNvPicPr>
+          <p:nvPr/>
+        </p:nvPicPr>
+        <p:blipFill>
+          <a:blip r:embed="rId2"/>
+          <a:stretch>
+            <a:fillRect/>
+          </a:stretch>
+        </p:blipFill>
+        <p:spPr>
+          <a:xfrm>
+            <a:off x="730434" y="2957665"/>
+            <a:ext cx="4729860" cy="3346376"/>
+          </a:xfrm>
+          <a:prstGeom prst="rect">
+            <a:avLst/>
+          </a:prstGeom>
+        </p:spPr>
+      </p:pic>
+      <p:pic>
+        <p:nvPicPr>
+          <p:cNvPr id="4" name="Picture 3">
+            <a:extLst>
+              <a:ext uri="{FF2B5EF4-FFF2-40B4-BE49-F238E27FC236}">
+                <a16:creationId xmlns:a16="http://schemas.microsoft.com/office/drawing/2014/main" id="{A1428457-1C92-B788-26C3-D368DF9C4893}"/>
+              </a:ext>
+            </a:extLst>
+          </p:cNvPr>
+          <p:cNvPicPr>
+            <a:picLocks noChangeAspect="1"/>
+          </p:cNvPicPr>
+          <p:nvPr/>
+        </p:nvPicPr>
+        <p:blipFill>
+          <a:blip r:embed="rId3"/>
+          <a:stretch>
+            <a:fillRect/>
+          </a:stretch>
+        </p:blipFill>
+        <p:spPr>
+          <a:xfrm>
+            <a:off x="6182505" y="3141567"/>
+            <a:ext cx="5828261" cy="2978571"/>
+          </a:xfrm>
+          <a:prstGeom prst="rect">
+            <a:avLst/>
+          </a:prstGeom>
+        </p:spPr>
+      </p:pic>
+    </p:spTree>
+    <p:extLst>
+      <p:ext uri="{BB962C8B-B14F-4D97-AF65-F5344CB8AC3E}">
+        <p14:creationId xmlns:p14="http://schemas.microsoft.com/office/powerpoint/2010/main" val="4018798804"/>
       </p:ext>
     </p:extLst>
   </p:cSld>
@@ -15484,6 +16796,185 @@
     <p:extLst>
       <p:ext uri="{BB962C8B-B14F-4D97-AF65-F5344CB8AC3E}">
         <p14:creationId xmlns:p14="http://schemas.microsoft.com/office/powerpoint/2010/main" val="82535919"/>
+      </p:ext>
+    </p:extLst>
+  </p:cSld>
+  <p:clrMapOvr>
+    <a:masterClrMapping/>
+  </p:clrMapOvr>
+</p:sld>
+</file>
+
+<file path=ppt/slides/slide50.xml><?xml version="1.0" encoding="utf-8"?>
+<p:sld xmlns:a="http://schemas.openxmlformats.org/drawingml/2006/main" xmlns:r="http://schemas.openxmlformats.org/officeDocument/2006/relationships" xmlns:p="http://schemas.openxmlformats.org/presentationml/2006/main">
+  <p:cSld>
+    <p:spTree>
+      <p:nvGrpSpPr>
+        <p:cNvPr id="1" name=""/>
+        <p:cNvGrpSpPr/>
+        <p:nvPr/>
+      </p:nvGrpSpPr>
+      <p:grpSpPr>
+        <a:xfrm>
+          <a:off x="0" y="0"/>
+          <a:ext cx="0" cy="0"/>
+          <a:chOff x="0" y="0"/>
+          <a:chExt cx="0" cy="0"/>
+        </a:xfrm>
+      </p:grpSpPr>
+      <p:sp>
+        <p:nvSpPr>
+          <p:cNvPr id="2" name="Title 1">
+            <a:extLst>
+              <a:ext uri="{FF2B5EF4-FFF2-40B4-BE49-F238E27FC236}">
+                <a16:creationId xmlns:a16="http://schemas.microsoft.com/office/drawing/2014/main" id="{61ACFAF2-4815-7C7D-3CDD-3A226EE7872D}"/>
+              </a:ext>
+            </a:extLst>
+          </p:cNvPr>
+          <p:cNvSpPr>
+            <a:spLocks noGrp="1"/>
+          </p:cNvSpPr>
+          <p:nvPr>
+            <p:ph type="title"/>
+          </p:nvPr>
+        </p:nvSpPr>
+        <p:spPr/>
+        <p:txBody>
+          <a:bodyPr/>
+          <a:lstStyle/>
+          <a:p>
+            <a:r>
+              <a:rPr lang="en-US" dirty="0"/>
+              <a:t>Challenges and Approaches</a:t>
+            </a:r>
+          </a:p>
+        </p:txBody>
+      </p:sp>
+      <p:sp>
+        <p:nvSpPr>
+          <p:cNvPr id="3" name="Text Placeholder 2">
+            <a:extLst>
+              <a:ext uri="{FF2B5EF4-FFF2-40B4-BE49-F238E27FC236}">
+                <a16:creationId xmlns:a16="http://schemas.microsoft.com/office/drawing/2014/main" id="{19D36134-935B-DDC7-EA80-80E8990AC7DB}"/>
+              </a:ext>
+            </a:extLst>
+          </p:cNvPr>
+          <p:cNvSpPr>
+            <a:spLocks noGrp="1"/>
+          </p:cNvSpPr>
+          <p:nvPr>
+            <p:ph type="body" idx="1"/>
+          </p:nvPr>
+        </p:nvSpPr>
+        <p:spPr/>
+        <p:txBody>
+          <a:bodyPr/>
+          <a:lstStyle/>
+          <a:p>
+            <a:endParaRPr lang="en-US" dirty="0"/>
+          </a:p>
+        </p:txBody>
+      </p:sp>
+    </p:spTree>
+    <p:extLst>
+      <p:ext uri="{BB962C8B-B14F-4D97-AF65-F5344CB8AC3E}">
+        <p14:creationId xmlns:p14="http://schemas.microsoft.com/office/powerpoint/2010/main" val="3647898038"/>
+      </p:ext>
+    </p:extLst>
+  </p:cSld>
+  <p:clrMapOvr>
+    <a:masterClrMapping/>
+  </p:clrMapOvr>
+</p:sld>
+</file>
+
+<file path=ppt/slides/slide51.xml><?xml version="1.0" encoding="utf-8"?>
+<p:sld xmlns:a="http://schemas.openxmlformats.org/drawingml/2006/main" xmlns:r="http://schemas.openxmlformats.org/officeDocument/2006/relationships" xmlns:p="http://schemas.openxmlformats.org/presentationml/2006/main">
+  <p:cSld>
+    <p:spTree>
+      <p:nvGrpSpPr>
+        <p:cNvPr id="1" name=""/>
+        <p:cNvGrpSpPr/>
+        <p:nvPr/>
+      </p:nvGrpSpPr>
+      <p:grpSpPr>
+        <a:xfrm>
+          <a:off x="0" y="0"/>
+          <a:ext cx="0" cy="0"/>
+          <a:chOff x="0" y="0"/>
+          <a:chExt cx="0" cy="0"/>
+        </a:xfrm>
+      </p:grpSpPr>
+      <p:sp>
+        <p:nvSpPr>
+          <p:cNvPr id="2" name="Title 1">
+            <a:extLst>
+              <a:ext uri="{FF2B5EF4-FFF2-40B4-BE49-F238E27FC236}">
+                <a16:creationId xmlns:a16="http://schemas.microsoft.com/office/drawing/2014/main" id="{8791DE50-7547-C314-242B-A61CE5466798}"/>
+              </a:ext>
+            </a:extLst>
+          </p:cNvPr>
+          <p:cNvSpPr>
+            <a:spLocks noGrp="1"/>
+          </p:cNvSpPr>
+          <p:nvPr>
+            <p:ph type="title"/>
+          </p:nvPr>
+        </p:nvSpPr>
+        <p:spPr/>
+        <p:txBody>
+          <a:bodyPr/>
+          <a:lstStyle/>
+          <a:p>
+            <a:r>
+              <a:rPr lang="en-US" dirty="0"/>
+              <a:t>Challenges and Approaches</a:t>
+            </a:r>
+          </a:p>
+        </p:txBody>
+      </p:sp>
+      <p:sp>
+        <p:nvSpPr>
+          <p:cNvPr id="3" name="Content Placeholder 2">
+            <a:extLst>
+              <a:ext uri="{FF2B5EF4-FFF2-40B4-BE49-F238E27FC236}">
+                <a16:creationId xmlns:a16="http://schemas.microsoft.com/office/drawing/2014/main" id="{E3DD0EBC-B2B3-215D-66AC-D307CB092F12}"/>
+              </a:ext>
+            </a:extLst>
+          </p:cNvPr>
+          <p:cNvSpPr>
+            <a:spLocks noGrp="1"/>
+          </p:cNvSpPr>
+          <p:nvPr>
+            <p:ph idx="1"/>
+          </p:nvPr>
+        </p:nvSpPr>
+        <p:spPr/>
+        <p:txBody>
+          <a:bodyPr/>
+          <a:lstStyle/>
+          <a:p>
+            <a:r>
+              <a:rPr lang="en-US" dirty="0"/>
+              <a:t>While the phone and watch both had the best results for random forest, the phone was much more accurate. We will have to learn how to leverage the scores from both devices to make the best prediction</a:t>
+            </a:r>
+          </a:p>
+          <a:p>
+            <a:r>
+              <a:rPr lang="en-US" dirty="0"/>
+              <a:t>Also, grouping by 3 seconds might not be the best aggregation</a:t>
+            </a:r>
+          </a:p>
+          <a:p>
+            <a:pPr lvl="1"/>
+            <a:endParaRPr lang="en-US" dirty="0"/>
+          </a:p>
+        </p:txBody>
+      </p:sp>
+    </p:spTree>
+    <p:extLst>
+      <p:ext uri="{BB962C8B-B14F-4D97-AF65-F5344CB8AC3E}">
+        <p14:creationId xmlns:p14="http://schemas.microsoft.com/office/powerpoint/2010/main" val="1961836344"/>
       </p:ext>
     </p:extLst>
   </p:cSld>

</xml_diff>